<commit_message>
LSTM model and results for predicting P&R
</commit_message>
<xml_diff>
--- a/Documentation/Presentations/Meeting 25-03-22.pptx
+++ b/Documentation/Presentations/Meeting 25-03-22.pptx
@@ -13,6 +13,8 @@
     <p:sldId id="259" r:id="rId7"/>
     <p:sldId id="260" r:id="rId8"/>
     <p:sldId id="261" r:id="rId9"/>
+    <p:sldId id="265" r:id="rId10"/>
+    <p:sldId id="264" r:id="rId11"/>
   </p:sldIdLst>
   <p:sldSz cx="12192000" cy="6858000"/>
   <p:notesSz cx="6858000" cy="9144000"/>
@@ -111,6 +113,11 @@
       </a:defRPr>
     </a:lvl9pPr>
   </p:defaultTextStyle>
+  <p:extLst>
+    <p:ext uri="{EFAFB233-063F-42B5-8137-9DF3F51BA10A}">
+      <p15:sldGuideLst xmlns:p15="http://schemas.microsoft.com/office/powerpoint/2012/main"/>
+    </p:ext>
+  </p:extLst>
 </p:presentation>
 </file>
 
@@ -261,7 +268,7 @@
           <a:p>
             <a:fld id="{38FF4823-5548-4404-A190-104BA95D2A65}" type="datetimeFigureOut">
               <a:rPr lang="en-US" smtClean="0"/>
-              <a:t>3/22/2022</a:t>
+              <a:t>3/23/2022</a:t>
             </a:fld>
             <a:endParaRPr lang="en-US"/>
           </a:p>
@@ -459,7 +466,7 @@
           <a:p>
             <a:fld id="{38FF4823-5548-4404-A190-104BA95D2A65}" type="datetimeFigureOut">
               <a:rPr lang="en-US" smtClean="0"/>
-              <a:t>3/22/2022</a:t>
+              <a:t>3/23/2022</a:t>
             </a:fld>
             <a:endParaRPr lang="en-US"/>
           </a:p>
@@ -667,7 +674,7 @@
           <a:p>
             <a:fld id="{38FF4823-5548-4404-A190-104BA95D2A65}" type="datetimeFigureOut">
               <a:rPr lang="en-US" smtClean="0"/>
-              <a:t>3/22/2022</a:t>
+              <a:t>3/23/2022</a:t>
             </a:fld>
             <a:endParaRPr lang="en-US"/>
           </a:p>
@@ -865,7 +872,7 @@
           <a:p>
             <a:fld id="{38FF4823-5548-4404-A190-104BA95D2A65}" type="datetimeFigureOut">
               <a:rPr lang="en-US" smtClean="0"/>
-              <a:t>3/22/2022</a:t>
+              <a:t>3/23/2022</a:t>
             </a:fld>
             <a:endParaRPr lang="en-US"/>
           </a:p>
@@ -1140,7 +1147,7 @@
           <a:p>
             <a:fld id="{38FF4823-5548-4404-A190-104BA95D2A65}" type="datetimeFigureOut">
               <a:rPr lang="en-US" smtClean="0"/>
-              <a:t>3/22/2022</a:t>
+              <a:t>3/23/2022</a:t>
             </a:fld>
             <a:endParaRPr lang="en-US"/>
           </a:p>
@@ -1405,7 +1412,7 @@
           <a:p>
             <a:fld id="{38FF4823-5548-4404-A190-104BA95D2A65}" type="datetimeFigureOut">
               <a:rPr lang="en-US" smtClean="0"/>
-              <a:t>3/22/2022</a:t>
+              <a:t>3/23/2022</a:t>
             </a:fld>
             <a:endParaRPr lang="en-US"/>
           </a:p>
@@ -1817,7 +1824,7 @@
           <a:p>
             <a:fld id="{38FF4823-5548-4404-A190-104BA95D2A65}" type="datetimeFigureOut">
               <a:rPr lang="en-US" smtClean="0"/>
-              <a:t>3/22/2022</a:t>
+              <a:t>3/23/2022</a:t>
             </a:fld>
             <a:endParaRPr lang="en-US"/>
           </a:p>
@@ -1958,7 +1965,7 @@
           <a:p>
             <a:fld id="{38FF4823-5548-4404-A190-104BA95D2A65}" type="datetimeFigureOut">
               <a:rPr lang="en-US" smtClean="0"/>
-              <a:t>3/22/2022</a:t>
+              <a:t>3/23/2022</a:t>
             </a:fld>
             <a:endParaRPr lang="en-US"/>
           </a:p>
@@ -2071,7 +2078,7 @@
           <a:p>
             <a:fld id="{38FF4823-5548-4404-A190-104BA95D2A65}" type="datetimeFigureOut">
               <a:rPr lang="en-US" smtClean="0"/>
-              <a:t>3/22/2022</a:t>
+              <a:t>3/23/2022</a:t>
             </a:fld>
             <a:endParaRPr lang="en-US"/>
           </a:p>
@@ -2382,7 +2389,7 @@
           <a:p>
             <a:fld id="{38FF4823-5548-4404-A190-104BA95D2A65}" type="datetimeFigureOut">
               <a:rPr lang="en-US" smtClean="0"/>
-              <a:t>3/22/2022</a:t>
+              <a:t>3/23/2022</a:t>
             </a:fld>
             <a:endParaRPr lang="en-US"/>
           </a:p>
@@ -2670,7 +2677,7 @@
           <a:p>
             <a:fld id="{38FF4823-5548-4404-A190-104BA95D2A65}" type="datetimeFigureOut">
               <a:rPr lang="en-US" smtClean="0"/>
-              <a:t>3/22/2022</a:t>
+              <a:t>3/23/2022</a:t>
             </a:fld>
             <a:endParaRPr lang="en-US"/>
           </a:p>
@@ -2911,7 +2918,7 @@
           <a:p>
             <a:fld id="{38FF4823-5548-4404-A190-104BA95D2A65}" type="datetimeFigureOut">
               <a:rPr lang="en-US" smtClean="0"/>
-              <a:t>3/22/2022</a:t>
+              <a:t>3/23/2022</a:t>
             </a:fld>
             <a:endParaRPr lang="en-US"/>
           </a:p>
@@ -3394,6 +3401,92 @@
 </p:sld>
 </file>
 
+<file path=ppt/slides/slide10.xml><?xml version="1.0" encoding="utf-8"?>
+<p:sld xmlns:a="http://schemas.openxmlformats.org/drawingml/2006/main" xmlns:r="http://schemas.openxmlformats.org/officeDocument/2006/relationships" xmlns:p="http://schemas.openxmlformats.org/presentationml/2006/main">
+  <p:cSld>
+    <p:spTree>
+      <p:nvGrpSpPr>
+        <p:cNvPr id="1" name=""/>
+        <p:cNvGrpSpPr/>
+        <p:nvPr/>
+      </p:nvGrpSpPr>
+      <p:grpSpPr>
+        <a:xfrm>
+          <a:off x="0" y="0"/>
+          <a:ext cx="0" cy="0"/>
+          <a:chOff x="0" y="0"/>
+          <a:chExt cx="0" cy="0"/>
+        </a:xfrm>
+      </p:grpSpPr>
+      <p:sp>
+        <p:nvSpPr>
+          <p:cNvPr id="2" name="Title 1">
+            <a:extLst>
+              <a:ext uri="{FF2B5EF4-FFF2-40B4-BE49-F238E27FC236}">
+                <a16:creationId xmlns:a16="http://schemas.microsoft.com/office/drawing/2014/main" id="{186D901E-75D7-4C61-8188-A873E73FDD93}"/>
+              </a:ext>
+            </a:extLst>
+          </p:cNvPr>
+          <p:cNvSpPr>
+            <a:spLocks noGrp="1"/>
+          </p:cNvSpPr>
+          <p:nvPr>
+            <p:ph type="title"/>
+          </p:nvPr>
+        </p:nvSpPr>
+        <p:spPr/>
+        <p:txBody>
+          <a:bodyPr/>
+          <a:lstStyle/>
+          <a:p>
+            <a:r>
+              <a:rPr lang="en-US" dirty="0"/>
+              <a:t>Plato thesis title</a:t>
+            </a:r>
+          </a:p>
+        </p:txBody>
+      </p:sp>
+      <p:sp>
+        <p:nvSpPr>
+          <p:cNvPr id="3" name="Content Placeholder 2">
+            <a:extLst>
+              <a:ext uri="{FF2B5EF4-FFF2-40B4-BE49-F238E27FC236}">
+                <a16:creationId xmlns:a16="http://schemas.microsoft.com/office/drawing/2014/main" id="{D3BB3BBB-B163-470C-841A-BFD3DFDF56FC}"/>
+              </a:ext>
+            </a:extLst>
+          </p:cNvPr>
+          <p:cNvSpPr>
+            <a:spLocks noGrp="1"/>
+          </p:cNvSpPr>
+          <p:nvPr>
+            <p:ph idx="1"/>
+          </p:nvPr>
+        </p:nvSpPr>
+        <p:spPr/>
+        <p:txBody>
+          <a:bodyPr/>
+          <a:lstStyle/>
+          <a:p>
+            <a:r>
+              <a:rPr lang="en-US" dirty="0"/>
+              <a:t>“Ship motion prediction using deep learning and sensor fusion”</a:t>
+            </a:r>
+          </a:p>
+        </p:txBody>
+      </p:sp>
+    </p:spTree>
+    <p:extLst>
+      <p:ext uri="{BB962C8B-B14F-4D97-AF65-F5344CB8AC3E}">
+        <p14:creationId xmlns:p14="http://schemas.microsoft.com/office/powerpoint/2010/main" val="878874818"/>
+      </p:ext>
+    </p:extLst>
+  </p:cSld>
+  <p:clrMapOvr>
+    <a:masterClrMapping/>
+  </p:clrMapOvr>
+</p:sld>
+</file>
+
 <file path=ppt/slides/slide2.xml><?xml version="1.0" encoding="utf-8"?>
 <p:sld xmlns:a="http://schemas.openxmlformats.org/drawingml/2006/main" xmlns:r="http://schemas.openxmlformats.org/officeDocument/2006/relationships" xmlns:p="http://schemas.openxmlformats.org/presentationml/2006/main">
   <p:cSld>
@@ -4211,6 +4304,99 @@
     <p:extLst>
       <p:ext uri="{BB962C8B-B14F-4D97-AF65-F5344CB8AC3E}">
         <p14:creationId xmlns:p14="http://schemas.microsoft.com/office/powerpoint/2010/main" val="2243441953"/>
+      </p:ext>
+    </p:extLst>
+  </p:cSld>
+  <p:clrMapOvr>
+    <a:masterClrMapping/>
+  </p:clrMapOvr>
+</p:sld>
+</file>
+
+<file path=ppt/slides/slide9.xml><?xml version="1.0" encoding="utf-8"?>
+<p:sld xmlns:a="http://schemas.openxmlformats.org/drawingml/2006/main" xmlns:r="http://schemas.openxmlformats.org/officeDocument/2006/relationships" xmlns:p="http://schemas.openxmlformats.org/presentationml/2006/main">
+  <p:cSld>
+    <p:spTree>
+      <p:nvGrpSpPr>
+        <p:cNvPr id="1" name=""/>
+        <p:cNvGrpSpPr/>
+        <p:nvPr/>
+      </p:nvGrpSpPr>
+      <p:grpSpPr>
+        <a:xfrm>
+          <a:off x="0" y="0"/>
+          <a:ext cx="0" cy="0"/>
+          <a:chOff x="0" y="0"/>
+          <a:chExt cx="0" cy="0"/>
+        </a:xfrm>
+      </p:grpSpPr>
+      <p:sp>
+        <p:nvSpPr>
+          <p:cNvPr id="2" name="Title 1">
+            <a:extLst>
+              <a:ext uri="{FF2B5EF4-FFF2-40B4-BE49-F238E27FC236}">
+                <a16:creationId xmlns:a16="http://schemas.microsoft.com/office/drawing/2014/main" id="{BA022918-8E0A-4718-AC66-06EB82A9E56D}"/>
+              </a:ext>
+            </a:extLst>
+          </p:cNvPr>
+          <p:cNvSpPr>
+            <a:spLocks noGrp="1"/>
+          </p:cNvSpPr>
+          <p:nvPr>
+            <p:ph type="title"/>
+          </p:nvPr>
+        </p:nvSpPr>
+        <p:spPr/>
+        <p:txBody>
+          <a:bodyPr/>
+          <a:lstStyle/>
+          <a:p>
+            <a:r>
+              <a:rPr lang="en-US" dirty="0"/>
+              <a:t>PR predictor</a:t>
+            </a:r>
+          </a:p>
+        </p:txBody>
+      </p:sp>
+      <p:pic>
+        <p:nvPicPr>
+          <p:cNvPr id="9" name="Content Placeholder 8" descr="A picture containing shape&#10;&#10;Description automatically generated">
+            <a:extLst>
+              <a:ext uri="{FF2B5EF4-FFF2-40B4-BE49-F238E27FC236}">
+                <a16:creationId xmlns:a16="http://schemas.microsoft.com/office/drawing/2014/main" id="{25870745-0B01-420D-98D2-A35A0CE6F685}"/>
+              </a:ext>
+            </a:extLst>
+          </p:cNvPr>
+          <p:cNvPicPr>
+            <a:picLocks noGrp="1" noChangeAspect="1"/>
+          </p:cNvPicPr>
+          <p:nvPr>
+            <p:ph idx="1"/>
+          </p:nvPr>
+        </p:nvPicPr>
+        <p:blipFill>
+          <a:blip r:embed="rId2">
+            <a:extLst>
+              <a:ext uri="{28A0092B-C50C-407E-A947-70E740481C1C}">
+                <a14:useLocalDpi xmlns:a14="http://schemas.microsoft.com/office/drawing/2010/main" val="0"/>
+              </a:ext>
+            </a:extLst>
+          </a:blip>
+          <a:stretch>
+            <a:fillRect/>
+          </a:stretch>
+        </p:blipFill>
+        <p:spPr>
+          <a:xfrm>
+            <a:off x="387927" y="1385833"/>
+            <a:ext cx="11074400" cy="5472167"/>
+          </a:xfrm>
+        </p:spPr>
+      </p:pic>
+    </p:spTree>
+    <p:extLst>
+      <p:ext uri="{BB962C8B-B14F-4D97-AF65-F5344CB8AC3E}">
+        <p14:creationId xmlns:p14="http://schemas.microsoft.com/office/powerpoint/2010/main" val="1653259552"/>
       </p:ext>
     </p:extLst>
   </p:cSld>

</xml_diff>

<commit_message>
testing PR model with diff seq length
</commit_message>
<xml_diff>
--- a/Documentation/Presentations/Meeting 25-03-22.pptx
+++ b/Documentation/Presentations/Meeting 25-03-22.pptx
@@ -6,15 +6,29 @@
   </p:sldMasterIdLst>
   <p:sldIdLst>
     <p:sldId id="256" r:id="rId2"/>
-    <p:sldId id="263" r:id="rId3"/>
-    <p:sldId id="257" r:id="rId4"/>
-    <p:sldId id="262" r:id="rId5"/>
-    <p:sldId id="258" r:id="rId6"/>
-    <p:sldId id="259" r:id="rId7"/>
-    <p:sldId id="260" r:id="rId8"/>
-    <p:sldId id="261" r:id="rId9"/>
-    <p:sldId id="265" r:id="rId10"/>
-    <p:sldId id="264" r:id="rId11"/>
+    <p:sldId id="266" r:id="rId3"/>
+    <p:sldId id="263" r:id="rId4"/>
+    <p:sldId id="257" r:id="rId5"/>
+    <p:sldId id="262" r:id="rId6"/>
+    <p:sldId id="258" r:id="rId7"/>
+    <p:sldId id="259" r:id="rId8"/>
+    <p:sldId id="260" r:id="rId9"/>
+    <p:sldId id="261" r:id="rId10"/>
+    <p:sldId id="280" r:id="rId11"/>
+    <p:sldId id="278" r:id="rId12"/>
+    <p:sldId id="265" r:id="rId13"/>
+    <p:sldId id="268" r:id="rId14"/>
+    <p:sldId id="270" r:id="rId15"/>
+    <p:sldId id="269" r:id="rId16"/>
+    <p:sldId id="271" r:id="rId17"/>
+    <p:sldId id="277" r:id="rId18"/>
+    <p:sldId id="272" r:id="rId19"/>
+    <p:sldId id="273" r:id="rId20"/>
+    <p:sldId id="274" r:id="rId21"/>
+    <p:sldId id="275" r:id="rId22"/>
+    <p:sldId id="276" r:id="rId23"/>
+    <p:sldId id="279" r:id="rId24"/>
+    <p:sldId id="264" r:id="rId25"/>
   </p:sldIdLst>
   <p:sldSz cx="12192000" cy="6858000"/>
   <p:notesSz cx="6858000" cy="9144000"/>
@@ -268,7 +282,7 @@
           <a:p>
             <a:fld id="{38FF4823-5548-4404-A190-104BA95D2A65}" type="datetimeFigureOut">
               <a:rPr lang="en-US" smtClean="0"/>
-              <a:t>3/23/2022</a:t>
+              <a:t>3/24/2022</a:t>
             </a:fld>
             <a:endParaRPr lang="en-US"/>
           </a:p>
@@ -466,7 +480,7 @@
           <a:p>
             <a:fld id="{38FF4823-5548-4404-A190-104BA95D2A65}" type="datetimeFigureOut">
               <a:rPr lang="en-US" smtClean="0"/>
-              <a:t>3/23/2022</a:t>
+              <a:t>3/24/2022</a:t>
             </a:fld>
             <a:endParaRPr lang="en-US"/>
           </a:p>
@@ -674,7 +688,7 @@
           <a:p>
             <a:fld id="{38FF4823-5548-4404-A190-104BA95D2A65}" type="datetimeFigureOut">
               <a:rPr lang="en-US" smtClean="0"/>
-              <a:t>3/23/2022</a:t>
+              <a:t>3/24/2022</a:t>
             </a:fld>
             <a:endParaRPr lang="en-US"/>
           </a:p>
@@ -872,7 +886,7 @@
           <a:p>
             <a:fld id="{38FF4823-5548-4404-A190-104BA95D2A65}" type="datetimeFigureOut">
               <a:rPr lang="en-US" smtClean="0"/>
-              <a:t>3/23/2022</a:t>
+              <a:t>3/24/2022</a:t>
             </a:fld>
             <a:endParaRPr lang="en-US"/>
           </a:p>
@@ -1147,7 +1161,7 @@
           <a:p>
             <a:fld id="{38FF4823-5548-4404-A190-104BA95D2A65}" type="datetimeFigureOut">
               <a:rPr lang="en-US" smtClean="0"/>
-              <a:t>3/23/2022</a:t>
+              <a:t>3/24/2022</a:t>
             </a:fld>
             <a:endParaRPr lang="en-US"/>
           </a:p>
@@ -1412,7 +1426,7 @@
           <a:p>
             <a:fld id="{38FF4823-5548-4404-A190-104BA95D2A65}" type="datetimeFigureOut">
               <a:rPr lang="en-US" smtClean="0"/>
-              <a:t>3/23/2022</a:t>
+              <a:t>3/24/2022</a:t>
             </a:fld>
             <a:endParaRPr lang="en-US"/>
           </a:p>
@@ -1824,7 +1838,7 @@
           <a:p>
             <a:fld id="{38FF4823-5548-4404-A190-104BA95D2A65}" type="datetimeFigureOut">
               <a:rPr lang="en-US" smtClean="0"/>
-              <a:t>3/23/2022</a:t>
+              <a:t>3/24/2022</a:t>
             </a:fld>
             <a:endParaRPr lang="en-US"/>
           </a:p>
@@ -1965,7 +1979,7 @@
           <a:p>
             <a:fld id="{38FF4823-5548-4404-A190-104BA95D2A65}" type="datetimeFigureOut">
               <a:rPr lang="en-US" smtClean="0"/>
-              <a:t>3/23/2022</a:t>
+              <a:t>3/24/2022</a:t>
             </a:fld>
             <a:endParaRPr lang="en-US"/>
           </a:p>
@@ -2078,7 +2092,7 @@
           <a:p>
             <a:fld id="{38FF4823-5548-4404-A190-104BA95D2A65}" type="datetimeFigureOut">
               <a:rPr lang="en-US" smtClean="0"/>
-              <a:t>3/23/2022</a:t>
+              <a:t>3/24/2022</a:t>
             </a:fld>
             <a:endParaRPr lang="en-US"/>
           </a:p>
@@ -2389,7 +2403,7 @@
           <a:p>
             <a:fld id="{38FF4823-5548-4404-A190-104BA95D2A65}" type="datetimeFigureOut">
               <a:rPr lang="en-US" smtClean="0"/>
-              <a:t>3/23/2022</a:t>
+              <a:t>3/24/2022</a:t>
             </a:fld>
             <a:endParaRPr lang="en-US"/>
           </a:p>
@@ -2677,7 +2691,7 @@
           <a:p>
             <a:fld id="{38FF4823-5548-4404-A190-104BA95D2A65}" type="datetimeFigureOut">
               <a:rPr lang="en-US" smtClean="0"/>
-              <a:t>3/23/2022</a:t>
+              <a:t>3/24/2022</a:t>
             </a:fld>
             <a:endParaRPr lang="en-US"/>
           </a:p>
@@ -2918,7 +2932,7 @@
           <a:p>
             <a:fld id="{38FF4823-5548-4404-A190-104BA95D2A65}" type="datetimeFigureOut">
               <a:rPr lang="en-US" smtClean="0"/>
-              <a:t>3/23/2022</a:t>
+              <a:t>3/24/2022</a:t>
             </a:fld>
             <a:endParaRPr lang="en-US"/>
           </a:p>
@@ -3423,7 +3437,7 @@
           <p:cNvPr id="2" name="Title 1">
             <a:extLst>
               <a:ext uri="{FF2B5EF4-FFF2-40B4-BE49-F238E27FC236}">
-                <a16:creationId xmlns:a16="http://schemas.microsoft.com/office/drawing/2014/main" id="{186D901E-75D7-4C61-8188-A873E73FDD93}"/>
+                <a16:creationId xmlns:a16="http://schemas.microsoft.com/office/drawing/2014/main" id="{E0C99628-6D05-4E50-967C-BD6AB7EAC16D}"/>
               </a:ext>
             </a:extLst>
           </p:cNvPr>
@@ -3441,7 +3455,7 @@
           <a:p>
             <a:r>
               <a:rPr lang="en-US" dirty="0"/>
-              <a:t>Plato thesis title</a:t>
+              <a:t>LSTM models to predict PR simultaneous</a:t>
             </a:r>
           </a:p>
         </p:txBody>
@@ -3451,7 +3465,7 @@
           <p:cNvPr id="3" name="Content Placeholder 2">
             <a:extLst>
               <a:ext uri="{FF2B5EF4-FFF2-40B4-BE49-F238E27FC236}">
-                <a16:creationId xmlns:a16="http://schemas.microsoft.com/office/drawing/2014/main" id="{D3BB3BBB-B163-470C-841A-BFD3DFDF56FC}"/>
+                <a16:creationId xmlns:a16="http://schemas.microsoft.com/office/drawing/2014/main" id="{87C38115-DA69-4933-93A1-084BC4408424}"/>
               </a:ext>
             </a:extLst>
           </p:cNvPr>
@@ -3469,7 +3483,45 @@
           <a:p>
             <a:r>
               <a:rPr lang="en-US" dirty="0"/>
-              <a:t>“Ship motion prediction using deep learning and sensor fusion”</a:t>
+              <a:t>Input/output:</a:t>
+            </a:r>
+          </a:p>
+          <a:p>
+            <a:pPr lvl="1"/>
+            <a:r>
+              <a:rPr lang="en-US" dirty="0"/>
+              <a:t>50x2 input -&gt; 1x2 output</a:t>
+            </a:r>
+          </a:p>
+          <a:p>
+            <a:pPr lvl="1"/>
+            <a:r>
+              <a:rPr lang="en-US" dirty="0"/>
+              <a:t>10x2 input -&gt; 1x2 output</a:t>
+            </a:r>
+          </a:p>
+          <a:p>
+            <a:r>
+              <a:rPr lang="en-US" dirty="0"/>
+              <a:t>2 Stacked LSTM’s</a:t>
+            </a:r>
+          </a:p>
+          <a:p>
+            <a:r>
+              <a:rPr lang="en-US" dirty="0"/>
+              <a:t>128 hidden layers</a:t>
+            </a:r>
+          </a:p>
+          <a:p>
+            <a:r>
+              <a:rPr lang="en-US" dirty="0"/>
+              <a:t>50 and 10 epochs</a:t>
+            </a:r>
+          </a:p>
+          <a:p>
+            <a:r>
+              <a:rPr lang="en-US" dirty="0"/>
+              <a:t>64 batch size</a:t>
             </a:r>
           </a:p>
         </p:txBody>
@@ -3477,7 +3529,982 @@
     </p:spTree>
     <p:extLst>
       <p:ext uri="{BB962C8B-B14F-4D97-AF65-F5344CB8AC3E}">
-        <p14:creationId xmlns:p14="http://schemas.microsoft.com/office/powerpoint/2010/main" val="878874818"/>
+        <p14:creationId xmlns:p14="http://schemas.microsoft.com/office/powerpoint/2010/main" val="2905913847"/>
+      </p:ext>
+    </p:extLst>
+  </p:cSld>
+  <p:clrMapOvr>
+    <a:masterClrMapping/>
+  </p:clrMapOvr>
+</p:sld>
+</file>
+
+<file path=ppt/slides/slide11.xml><?xml version="1.0" encoding="utf-8"?>
+<p:sld xmlns:a="http://schemas.openxmlformats.org/drawingml/2006/main" xmlns:r="http://schemas.openxmlformats.org/officeDocument/2006/relationships" xmlns:p="http://schemas.openxmlformats.org/presentationml/2006/main">
+  <p:cSld>
+    <p:spTree>
+      <p:nvGrpSpPr>
+        <p:cNvPr id="1" name=""/>
+        <p:cNvGrpSpPr/>
+        <p:nvPr/>
+      </p:nvGrpSpPr>
+      <p:grpSpPr>
+        <a:xfrm>
+          <a:off x="0" y="0"/>
+          <a:ext cx="0" cy="0"/>
+          <a:chOff x="0" y="0"/>
+          <a:chExt cx="0" cy="0"/>
+        </a:xfrm>
+      </p:grpSpPr>
+      <p:sp>
+        <p:nvSpPr>
+          <p:cNvPr id="2" name="Title 1">
+            <a:extLst>
+              <a:ext uri="{FF2B5EF4-FFF2-40B4-BE49-F238E27FC236}">
+                <a16:creationId xmlns:a16="http://schemas.microsoft.com/office/drawing/2014/main" id="{063E87AF-7117-4E21-8CC3-CE430064412A}"/>
+              </a:ext>
+            </a:extLst>
+          </p:cNvPr>
+          <p:cNvSpPr>
+            <a:spLocks noGrp="1"/>
+          </p:cNvSpPr>
+          <p:nvPr>
+            <p:ph type="ctrTitle"/>
+          </p:nvPr>
+        </p:nvSpPr>
+        <p:spPr/>
+        <p:txBody>
+          <a:bodyPr/>
+          <a:lstStyle/>
+          <a:p>
+            <a:r>
+              <a:rPr lang="en-US" dirty="0"/>
+              <a:t>PR 50</a:t>
+            </a:r>
+          </a:p>
+        </p:txBody>
+      </p:sp>
+      <p:sp>
+        <p:nvSpPr>
+          <p:cNvPr id="3" name="Subtitle 2">
+            <a:extLst>
+              <a:ext uri="{FF2B5EF4-FFF2-40B4-BE49-F238E27FC236}">
+                <a16:creationId xmlns:a16="http://schemas.microsoft.com/office/drawing/2014/main" id="{89AA2A79-1BE0-4C3B-9EAA-3C52052A81E6}"/>
+              </a:ext>
+            </a:extLst>
+          </p:cNvPr>
+          <p:cNvSpPr>
+            <a:spLocks noGrp="1"/>
+          </p:cNvSpPr>
+          <p:nvPr>
+            <p:ph type="subTitle" idx="1"/>
+          </p:nvPr>
+        </p:nvSpPr>
+        <p:spPr/>
+        <p:txBody>
+          <a:bodyPr/>
+          <a:lstStyle/>
+          <a:p>
+            <a:endParaRPr lang="en-US"/>
+          </a:p>
+        </p:txBody>
+      </p:sp>
+    </p:spTree>
+    <p:extLst>
+      <p:ext uri="{BB962C8B-B14F-4D97-AF65-F5344CB8AC3E}">
+        <p14:creationId xmlns:p14="http://schemas.microsoft.com/office/powerpoint/2010/main" val="2352510707"/>
+      </p:ext>
+    </p:extLst>
+  </p:cSld>
+  <p:clrMapOvr>
+    <a:masterClrMapping/>
+  </p:clrMapOvr>
+</p:sld>
+</file>
+
+<file path=ppt/slides/slide12.xml><?xml version="1.0" encoding="utf-8"?>
+<p:sld xmlns:a="http://schemas.openxmlformats.org/drawingml/2006/main" xmlns:r="http://schemas.openxmlformats.org/officeDocument/2006/relationships" xmlns:p="http://schemas.openxmlformats.org/presentationml/2006/main">
+  <p:cSld>
+    <p:spTree>
+      <p:nvGrpSpPr>
+        <p:cNvPr id="1" name=""/>
+        <p:cNvGrpSpPr/>
+        <p:nvPr/>
+      </p:nvGrpSpPr>
+      <p:grpSpPr>
+        <a:xfrm>
+          <a:off x="0" y="0"/>
+          <a:ext cx="0" cy="0"/>
+          <a:chOff x="0" y="0"/>
+          <a:chExt cx="0" cy="0"/>
+        </a:xfrm>
+      </p:grpSpPr>
+      <p:sp>
+        <p:nvSpPr>
+          <p:cNvPr id="2" name="Title 1">
+            <a:extLst>
+              <a:ext uri="{FF2B5EF4-FFF2-40B4-BE49-F238E27FC236}">
+                <a16:creationId xmlns:a16="http://schemas.microsoft.com/office/drawing/2014/main" id="{BA022918-8E0A-4718-AC66-06EB82A9E56D}"/>
+              </a:ext>
+            </a:extLst>
+          </p:cNvPr>
+          <p:cNvSpPr>
+            <a:spLocks noGrp="1"/>
+          </p:cNvSpPr>
+          <p:nvPr>
+            <p:ph type="title"/>
+          </p:nvPr>
+        </p:nvSpPr>
+        <p:spPr/>
+        <p:txBody>
+          <a:bodyPr/>
+          <a:lstStyle/>
+          <a:p>
+            <a:r>
+              <a:rPr lang="en-US" dirty="0"/>
+              <a:t>PR predictor – training loss</a:t>
+            </a:r>
+          </a:p>
+        </p:txBody>
+      </p:sp>
+      <p:pic>
+        <p:nvPicPr>
+          <p:cNvPr id="9" name="Content Placeholder 8" descr="A picture containing shape&#10;&#10;Description automatically generated">
+            <a:extLst>
+              <a:ext uri="{FF2B5EF4-FFF2-40B4-BE49-F238E27FC236}">
+                <a16:creationId xmlns:a16="http://schemas.microsoft.com/office/drawing/2014/main" id="{25870745-0B01-420D-98D2-A35A0CE6F685}"/>
+              </a:ext>
+            </a:extLst>
+          </p:cNvPr>
+          <p:cNvPicPr>
+            <a:picLocks noGrp="1" noChangeAspect="1"/>
+          </p:cNvPicPr>
+          <p:nvPr>
+            <p:ph idx="1"/>
+          </p:nvPr>
+        </p:nvPicPr>
+        <p:blipFill>
+          <a:blip r:embed="rId2">
+            <a:extLst>
+              <a:ext uri="{28A0092B-C50C-407E-A947-70E740481C1C}">
+                <a14:useLocalDpi xmlns:a14="http://schemas.microsoft.com/office/drawing/2010/main" val="0"/>
+              </a:ext>
+            </a:extLst>
+          </a:blip>
+          <a:stretch>
+            <a:fillRect/>
+          </a:stretch>
+        </p:blipFill>
+        <p:spPr>
+          <a:xfrm>
+            <a:off x="387927" y="1385833"/>
+            <a:ext cx="11074400" cy="5472167"/>
+          </a:xfrm>
+        </p:spPr>
+      </p:pic>
+    </p:spTree>
+    <p:extLst>
+      <p:ext uri="{BB962C8B-B14F-4D97-AF65-F5344CB8AC3E}">
+        <p14:creationId xmlns:p14="http://schemas.microsoft.com/office/powerpoint/2010/main" val="1653259552"/>
+      </p:ext>
+    </p:extLst>
+  </p:cSld>
+  <p:clrMapOvr>
+    <a:masterClrMapping/>
+  </p:clrMapOvr>
+</p:sld>
+</file>
+
+<file path=ppt/slides/slide13.xml><?xml version="1.0" encoding="utf-8"?>
+<p:sld xmlns:a="http://schemas.openxmlformats.org/drawingml/2006/main" xmlns:r="http://schemas.openxmlformats.org/officeDocument/2006/relationships" xmlns:p="http://schemas.openxmlformats.org/presentationml/2006/main">
+  <p:cSld>
+    <p:spTree>
+      <p:nvGrpSpPr>
+        <p:cNvPr id="1" name=""/>
+        <p:cNvGrpSpPr/>
+        <p:nvPr/>
+      </p:nvGrpSpPr>
+      <p:grpSpPr>
+        <a:xfrm>
+          <a:off x="0" y="0"/>
+          <a:ext cx="0" cy="0"/>
+          <a:chOff x="0" y="0"/>
+          <a:chExt cx="0" cy="0"/>
+        </a:xfrm>
+      </p:grpSpPr>
+      <p:sp>
+        <p:nvSpPr>
+          <p:cNvPr id="2" name="Title 1">
+            <a:extLst>
+              <a:ext uri="{FF2B5EF4-FFF2-40B4-BE49-F238E27FC236}">
+                <a16:creationId xmlns:a16="http://schemas.microsoft.com/office/drawing/2014/main" id="{07EDA2B3-CC82-444B-A55E-D02559A5D5EA}"/>
+              </a:ext>
+            </a:extLst>
+          </p:cNvPr>
+          <p:cNvSpPr>
+            <a:spLocks noGrp="1"/>
+          </p:cNvSpPr>
+          <p:nvPr>
+            <p:ph type="title"/>
+          </p:nvPr>
+        </p:nvSpPr>
+        <p:spPr/>
+        <p:txBody>
+          <a:bodyPr/>
+          <a:lstStyle/>
+          <a:p>
+            <a:r>
+              <a:rPr lang="en-US" dirty="0"/>
+              <a:t>PR predictor - Pitch</a:t>
+            </a:r>
+          </a:p>
+        </p:txBody>
+      </p:sp>
+      <p:pic>
+        <p:nvPicPr>
+          <p:cNvPr id="5" name="Content Placeholder 4" descr="Chart&#10;&#10;Description automatically generated">
+            <a:extLst>
+              <a:ext uri="{FF2B5EF4-FFF2-40B4-BE49-F238E27FC236}">
+                <a16:creationId xmlns:a16="http://schemas.microsoft.com/office/drawing/2014/main" id="{F35B1050-6A67-4596-8FCC-034B5CC895B8}"/>
+              </a:ext>
+            </a:extLst>
+          </p:cNvPr>
+          <p:cNvPicPr>
+            <a:picLocks noGrp="1" noChangeAspect="1"/>
+          </p:cNvPicPr>
+          <p:nvPr>
+            <p:ph idx="1"/>
+          </p:nvPr>
+        </p:nvPicPr>
+        <p:blipFill>
+          <a:blip r:embed="rId2">
+            <a:extLst>
+              <a:ext uri="{28A0092B-C50C-407E-A947-70E740481C1C}">
+                <a14:useLocalDpi xmlns:a14="http://schemas.microsoft.com/office/drawing/2010/main" val="0"/>
+              </a:ext>
+            </a:extLst>
+          </a:blip>
+          <a:stretch>
+            <a:fillRect/>
+          </a:stretch>
+        </p:blipFill>
+        <p:spPr>
+          <a:xfrm>
+            <a:off x="1453658" y="1690688"/>
+            <a:ext cx="8785919" cy="4351338"/>
+          </a:xfrm>
+        </p:spPr>
+      </p:pic>
+    </p:spTree>
+    <p:extLst>
+      <p:ext uri="{BB962C8B-B14F-4D97-AF65-F5344CB8AC3E}">
+        <p14:creationId xmlns:p14="http://schemas.microsoft.com/office/powerpoint/2010/main" val="424028336"/>
+      </p:ext>
+    </p:extLst>
+  </p:cSld>
+  <p:clrMapOvr>
+    <a:masterClrMapping/>
+  </p:clrMapOvr>
+</p:sld>
+</file>
+
+<file path=ppt/slides/slide14.xml><?xml version="1.0" encoding="utf-8"?>
+<p:sld xmlns:a="http://schemas.openxmlformats.org/drawingml/2006/main" xmlns:r="http://schemas.openxmlformats.org/officeDocument/2006/relationships" xmlns:p="http://schemas.openxmlformats.org/presentationml/2006/main">
+  <p:cSld>
+    <p:spTree>
+      <p:nvGrpSpPr>
+        <p:cNvPr id="1" name=""/>
+        <p:cNvGrpSpPr/>
+        <p:nvPr/>
+      </p:nvGrpSpPr>
+      <p:grpSpPr>
+        <a:xfrm>
+          <a:off x="0" y="0"/>
+          <a:ext cx="0" cy="0"/>
+          <a:chOff x="0" y="0"/>
+          <a:chExt cx="0" cy="0"/>
+        </a:xfrm>
+      </p:grpSpPr>
+      <p:sp>
+        <p:nvSpPr>
+          <p:cNvPr id="2" name="Title 1">
+            <a:extLst>
+              <a:ext uri="{FF2B5EF4-FFF2-40B4-BE49-F238E27FC236}">
+                <a16:creationId xmlns:a16="http://schemas.microsoft.com/office/drawing/2014/main" id="{07EDA2B3-CC82-444B-A55E-D02559A5D5EA}"/>
+              </a:ext>
+            </a:extLst>
+          </p:cNvPr>
+          <p:cNvSpPr>
+            <a:spLocks noGrp="1"/>
+          </p:cNvSpPr>
+          <p:nvPr>
+            <p:ph type="title"/>
+          </p:nvPr>
+        </p:nvSpPr>
+        <p:spPr/>
+        <p:txBody>
+          <a:bodyPr/>
+          <a:lstStyle/>
+          <a:p>
+            <a:r>
+              <a:rPr lang="en-US" dirty="0"/>
+              <a:t>PR predictor - Pitch</a:t>
+            </a:r>
+          </a:p>
+        </p:txBody>
+      </p:sp>
+      <p:sp>
+        <p:nvSpPr>
+          <p:cNvPr id="3" name="Content Placeholder 2">
+            <a:extLst>
+              <a:ext uri="{FF2B5EF4-FFF2-40B4-BE49-F238E27FC236}">
+                <a16:creationId xmlns:a16="http://schemas.microsoft.com/office/drawing/2014/main" id="{0C4ACD3F-9085-46CD-8AEA-A9403BCA76F7}"/>
+              </a:ext>
+            </a:extLst>
+          </p:cNvPr>
+          <p:cNvSpPr>
+            <a:spLocks noGrp="1"/>
+          </p:cNvSpPr>
+          <p:nvPr>
+            <p:ph idx="1"/>
+          </p:nvPr>
+        </p:nvSpPr>
+        <p:spPr/>
+        <p:txBody>
+          <a:bodyPr>
+            <a:normAutofit lnSpcReduction="10000"/>
+          </a:bodyPr>
+          <a:lstStyle/>
+          <a:p>
+            <a:r>
+              <a:rPr lang="en-US" dirty="0"/>
+              <a:t>Real prediction</a:t>
+            </a:r>
+          </a:p>
+          <a:p>
+            <a:pPr lvl="1"/>
+            <a:r>
+              <a:rPr lang="en-US" dirty="0"/>
+              <a:t>MSE: 	0.000584</a:t>
+            </a:r>
+          </a:p>
+          <a:p>
+            <a:pPr lvl="1"/>
+            <a:r>
+              <a:rPr lang="en-US" dirty="0"/>
+              <a:t>RMSE: 	0.0241</a:t>
+            </a:r>
+          </a:p>
+          <a:p>
+            <a:pPr lvl="1"/>
+            <a:r>
+              <a:rPr lang="en-US" dirty="0"/>
+              <a:t>RMSE </a:t>
+            </a:r>
+            <a:r>
+              <a:rPr lang="en-US" dirty="0" err="1"/>
+              <a:t>denorm</a:t>
+            </a:r>
+            <a:r>
+              <a:rPr lang="en-US" dirty="0"/>
+              <a:t>: 2.17°</a:t>
+            </a:r>
+          </a:p>
+          <a:p>
+            <a:r>
+              <a:rPr lang="en-US" dirty="0"/>
+              <a:t>Zero prediction</a:t>
+            </a:r>
+          </a:p>
+          <a:p>
+            <a:pPr lvl="1"/>
+            <a:r>
+              <a:rPr lang="en-US" dirty="0"/>
+              <a:t>MSE 0: 	0.00511</a:t>
+            </a:r>
+          </a:p>
+          <a:p>
+            <a:pPr lvl="1"/>
+            <a:r>
+              <a:rPr lang="en-US" dirty="0"/>
+              <a:t>RMSE 0: 	0.0715</a:t>
+            </a:r>
+          </a:p>
+          <a:p>
+            <a:pPr lvl="1"/>
+            <a:r>
+              <a:rPr lang="en-US" dirty="0"/>
+              <a:t>RMSE 0 </a:t>
+            </a:r>
+            <a:r>
+              <a:rPr lang="en-US" dirty="0" err="1"/>
+              <a:t>denorm</a:t>
+            </a:r>
+            <a:r>
+              <a:rPr lang="en-US" dirty="0"/>
+              <a:t>: 6.43°</a:t>
+            </a:r>
+          </a:p>
+          <a:p>
+            <a:r>
+              <a:rPr lang="en-US" dirty="0"/>
+              <a:t>Improvement on zero prediction:</a:t>
+            </a:r>
+          </a:p>
+          <a:p>
+            <a:pPr lvl="1"/>
+            <a:r>
+              <a:rPr lang="en-US" dirty="0"/>
+              <a:t>MSE delta%: 	874.53 %</a:t>
+            </a:r>
+          </a:p>
+          <a:p>
+            <a:pPr lvl="1"/>
+            <a:r>
+              <a:rPr lang="en-US" dirty="0"/>
+              <a:t>RMSE delta%: 	295.72 %</a:t>
+            </a:r>
+          </a:p>
+        </p:txBody>
+      </p:sp>
+    </p:spTree>
+    <p:extLst>
+      <p:ext uri="{BB962C8B-B14F-4D97-AF65-F5344CB8AC3E}">
+        <p14:creationId xmlns:p14="http://schemas.microsoft.com/office/powerpoint/2010/main" val="2372695598"/>
+      </p:ext>
+    </p:extLst>
+  </p:cSld>
+  <p:clrMapOvr>
+    <a:masterClrMapping/>
+  </p:clrMapOvr>
+</p:sld>
+</file>
+
+<file path=ppt/slides/slide15.xml><?xml version="1.0" encoding="utf-8"?>
+<p:sld xmlns:a="http://schemas.openxmlformats.org/drawingml/2006/main" xmlns:r="http://schemas.openxmlformats.org/officeDocument/2006/relationships" xmlns:p="http://schemas.openxmlformats.org/presentationml/2006/main">
+  <p:cSld>
+    <p:spTree>
+      <p:nvGrpSpPr>
+        <p:cNvPr id="1" name=""/>
+        <p:cNvGrpSpPr/>
+        <p:nvPr/>
+      </p:nvGrpSpPr>
+      <p:grpSpPr>
+        <a:xfrm>
+          <a:off x="0" y="0"/>
+          <a:ext cx="0" cy="0"/>
+          <a:chOff x="0" y="0"/>
+          <a:chExt cx="0" cy="0"/>
+        </a:xfrm>
+      </p:grpSpPr>
+      <p:sp>
+        <p:nvSpPr>
+          <p:cNvPr id="2" name="Title 1">
+            <a:extLst>
+              <a:ext uri="{FF2B5EF4-FFF2-40B4-BE49-F238E27FC236}">
+                <a16:creationId xmlns:a16="http://schemas.microsoft.com/office/drawing/2014/main" id="{8E64FC6F-F3DE-4E70-B5CD-BCDAC34D6F31}"/>
+              </a:ext>
+            </a:extLst>
+          </p:cNvPr>
+          <p:cNvSpPr>
+            <a:spLocks noGrp="1"/>
+          </p:cNvSpPr>
+          <p:nvPr>
+            <p:ph type="title"/>
+          </p:nvPr>
+        </p:nvSpPr>
+        <p:spPr/>
+        <p:txBody>
+          <a:bodyPr/>
+          <a:lstStyle/>
+          <a:p>
+            <a:r>
+              <a:rPr lang="en-US" dirty="0"/>
+              <a:t>PR predictor – Roll</a:t>
+            </a:r>
+          </a:p>
+        </p:txBody>
+      </p:sp>
+      <p:pic>
+        <p:nvPicPr>
+          <p:cNvPr id="5" name="Content Placeholder 4" descr="Chart&#10;&#10;Description automatically generated">
+            <a:extLst>
+              <a:ext uri="{FF2B5EF4-FFF2-40B4-BE49-F238E27FC236}">
+                <a16:creationId xmlns:a16="http://schemas.microsoft.com/office/drawing/2014/main" id="{C7DE6583-75AA-403A-BC67-51CD8A4107F7}"/>
+              </a:ext>
+            </a:extLst>
+          </p:cNvPr>
+          <p:cNvPicPr>
+            <a:picLocks noGrp="1" noChangeAspect="1"/>
+          </p:cNvPicPr>
+          <p:nvPr>
+            <p:ph idx="1"/>
+          </p:nvPr>
+        </p:nvPicPr>
+        <p:blipFill>
+          <a:blip r:embed="rId2">
+            <a:extLst>
+              <a:ext uri="{28A0092B-C50C-407E-A947-70E740481C1C}">
+                <a14:useLocalDpi xmlns:a14="http://schemas.microsoft.com/office/drawing/2010/main" val="0"/>
+              </a:ext>
+            </a:extLst>
+          </a:blip>
+          <a:stretch>
+            <a:fillRect/>
+          </a:stretch>
+        </p:blipFill>
+        <p:spPr>
+          <a:xfrm>
+            <a:off x="1703040" y="1825625"/>
+            <a:ext cx="8785919" cy="4351338"/>
+          </a:xfrm>
+        </p:spPr>
+      </p:pic>
+    </p:spTree>
+    <p:extLst>
+      <p:ext uri="{BB962C8B-B14F-4D97-AF65-F5344CB8AC3E}">
+        <p14:creationId xmlns:p14="http://schemas.microsoft.com/office/powerpoint/2010/main" val="109777308"/>
+      </p:ext>
+    </p:extLst>
+  </p:cSld>
+  <p:clrMapOvr>
+    <a:masterClrMapping/>
+  </p:clrMapOvr>
+</p:sld>
+</file>
+
+<file path=ppt/slides/slide16.xml><?xml version="1.0" encoding="utf-8"?>
+<p:sld xmlns:a="http://schemas.openxmlformats.org/drawingml/2006/main" xmlns:r="http://schemas.openxmlformats.org/officeDocument/2006/relationships" xmlns:p="http://schemas.openxmlformats.org/presentationml/2006/main">
+  <p:cSld>
+    <p:spTree>
+      <p:nvGrpSpPr>
+        <p:cNvPr id="1" name=""/>
+        <p:cNvGrpSpPr/>
+        <p:nvPr/>
+      </p:nvGrpSpPr>
+      <p:grpSpPr>
+        <a:xfrm>
+          <a:off x="0" y="0"/>
+          <a:ext cx="0" cy="0"/>
+          <a:chOff x="0" y="0"/>
+          <a:chExt cx="0" cy="0"/>
+        </a:xfrm>
+      </p:grpSpPr>
+      <p:sp>
+        <p:nvSpPr>
+          <p:cNvPr id="2" name="Title 1">
+            <a:extLst>
+              <a:ext uri="{FF2B5EF4-FFF2-40B4-BE49-F238E27FC236}">
+                <a16:creationId xmlns:a16="http://schemas.microsoft.com/office/drawing/2014/main" id="{8E64FC6F-F3DE-4E70-B5CD-BCDAC34D6F31}"/>
+              </a:ext>
+            </a:extLst>
+          </p:cNvPr>
+          <p:cNvSpPr>
+            <a:spLocks noGrp="1"/>
+          </p:cNvSpPr>
+          <p:nvPr>
+            <p:ph type="title"/>
+          </p:nvPr>
+        </p:nvSpPr>
+        <p:spPr/>
+        <p:txBody>
+          <a:bodyPr/>
+          <a:lstStyle/>
+          <a:p>
+            <a:r>
+              <a:rPr lang="en-US" dirty="0"/>
+              <a:t>PR predictor – Roll</a:t>
+            </a:r>
+          </a:p>
+        </p:txBody>
+      </p:sp>
+      <p:sp>
+        <p:nvSpPr>
+          <p:cNvPr id="3" name="Content Placeholder 2">
+            <a:extLst>
+              <a:ext uri="{FF2B5EF4-FFF2-40B4-BE49-F238E27FC236}">
+                <a16:creationId xmlns:a16="http://schemas.microsoft.com/office/drawing/2014/main" id="{969FBA46-760F-485A-B4AE-9054DD48BCC5}"/>
+              </a:ext>
+            </a:extLst>
+          </p:cNvPr>
+          <p:cNvSpPr>
+            <a:spLocks noGrp="1"/>
+          </p:cNvSpPr>
+          <p:nvPr>
+            <p:ph idx="1"/>
+          </p:nvPr>
+        </p:nvSpPr>
+        <p:spPr/>
+        <p:txBody>
+          <a:bodyPr>
+            <a:normAutofit lnSpcReduction="10000"/>
+          </a:bodyPr>
+          <a:lstStyle/>
+          <a:p>
+            <a:r>
+              <a:rPr lang="en-US" dirty="0"/>
+              <a:t>Real prediction</a:t>
+            </a:r>
+          </a:p>
+          <a:p>
+            <a:pPr lvl="1"/>
+            <a:r>
+              <a:rPr lang="en-US" dirty="0"/>
+              <a:t>MSE: 	0.000513</a:t>
+            </a:r>
+          </a:p>
+          <a:p>
+            <a:pPr lvl="1"/>
+            <a:r>
+              <a:rPr lang="en-US" dirty="0"/>
+              <a:t>RMSE: 	0.0226</a:t>
+            </a:r>
+          </a:p>
+          <a:p>
+            <a:pPr lvl="1"/>
+            <a:r>
+              <a:rPr lang="en-US" dirty="0"/>
+              <a:t>RMSE </a:t>
+            </a:r>
+            <a:r>
+              <a:rPr lang="en-US" dirty="0" err="1"/>
+              <a:t>denorm</a:t>
+            </a:r>
+            <a:r>
+              <a:rPr lang="en-US" dirty="0"/>
+              <a:t>: 2.03°</a:t>
+            </a:r>
+          </a:p>
+          <a:p>
+            <a:r>
+              <a:rPr lang="en-US" dirty="0"/>
+              <a:t>Zero prediction</a:t>
+            </a:r>
+          </a:p>
+          <a:p>
+            <a:pPr lvl="1"/>
+            <a:r>
+              <a:rPr lang="en-US" dirty="0"/>
+              <a:t>MSE 0: 	0.00657</a:t>
+            </a:r>
+          </a:p>
+          <a:p>
+            <a:pPr lvl="1"/>
+            <a:r>
+              <a:rPr lang="en-US" dirty="0"/>
+              <a:t>RMSE 0: 	0.0811</a:t>
+            </a:r>
+          </a:p>
+          <a:p>
+            <a:pPr lvl="1"/>
+            <a:r>
+              <a:rPr lang="en-US" dirty="0"/>
+              <a:t>RMSE 0 </a:t>
+            </a:r>
+            <a:r>
+              <a:rPr lang="en-US" dirty="0" err="1"/>
+              <a:t>denorm</a:t>
+            </a:r>
+            <a:r>
+              <a:rPr lang="en-US" dirty="0"/>
+              <a:t>: 7.29°</a:t>
+            </a:r>
+          </a:p>
+          <a:p>
+            <a:r>
+              <a:rPr lang="en-US" dirty="0"/>
+              <a:t>Improvement on zero prediction:</a:t>
+            </a:r>
+          </a:p>
+          <a:p>
+            <a:pPr lvl="1"/>
+            <a:r>
+              <a:rPr lang="en-US" dirty="0"/>
+              <a:t>MSE delta%: 	1281.26 %</a:t>
+            </a:r>
+          </a:p>
+          <a:p>
+            <a:pPr lvl="1"/>
+            <a:r>
+              <a:rPr lang="en-US" dirty="0"/>
+              <a:t>RMSE delta%:	357.95 %</a:t>
+            </a:r>
+          </a:p>
+        </p:txBody>
+      </p:sp>
+    </p:spTree>
+    <p:extLst>
+      <p:ext uri="{BB962C8B-B14F-4D97-AF65-F5344CB8AC3E}">
+        <p14:creationId xmlns:p14="http://schemas.microsoft.com/office/powerpoint/2010/main" val="2643515619"/>
+      </p:ext>
+    </p:extLst>
+  </p:cSld>
+  <p:clrMapOvr>
+    <a:masterClrMapping/>
+  </p:clrMapOvr>
+</p:sld>
+</file>
+
+<file path=ppt/slides/slide17.xml><?xml version="1.0" encoding="utf-8"?>
+<p:sld xmlns:a="http://schemas.openxmlformats.org/drawingml/2006/main" xmlns:r="http://schemas.openxmlformats.org/officeDocument/2006/relationships" xmlns:p="http://schemas.openxmlformats.org/presentationml/2006/main">
+  <p:cSld>
+    <p:spTree>
+      <p:nvGrpSpPr>
+        <p:cNvPr id="1" name=""/>
+        <p:cNvGrpSpPr/>
+        <p:nvPr/>
+      </p:nvGrpSpPr>
+      <p:grpSpPr>
+        <a:xfrm>
+          <a:off x="0" y="0"/>
+          <a:ext cx="0" cy="0"/>
+          <a:chOff x="0" y="0"/>
+          <a:chExt cx="0" cy="0"/>
+        </a:xfrm>
+      </p:grpSpPr>
+      <p:sp>
+        <p:nvSpPr>
+          <p:cNvPr id="2" name="Title 1">
+            <a:extLst>
+              <a:ext uri="{FF2B5EF4-FFF2-40B4-BE49-F238E27FC236}">
+                <a16:creationId xmlns:a16="http://schemas.microsoft.com/office/drawing/2014/main" id="{8F26E1C5-DF5A-490F-A88C-5C905B1F6AE0}"/>
+              </a:ext>
+            </a:extLst>
+          </p:cNvPr>
+          <p:cNvSpPr>
+            <a:spLocks noGrp="1"/>
+          </p:cNvSpPr>
+          <p:nvPr>
+            <p:ph type="ctrTitle"/>
+          </p:nvPr>
+        </p:nvSpPr>
+        <p:spPr/>
+        <p:txBody>
+          <a:bodyPr/>
+          <a:lstStyle/>
+          <a:p>
+            <a:r>
+              <a:rPr lang="en-US" dirty="0"/>
+              <a:t>PR 10</a:t>
+            </a:r>
+          </a:p>
+        </p:txBody>
+      </p:sp>
+      <p:sp>
+        <p:nvSpPr>
+          <p:cNvPr id="3" name="Subtitle 2">
+            <a:extLst>
+              <a:ext uri="{FF2B5EF4-FFF2-40B4-BE49-F238E27FC236}">
+                <a16:creationId xmlns:a16="http://schemas.microsoft.com/office/drawing/2014/main" id="{CC6E06F3-1825-4CA3-B1F0-623294044B38}"/>
+              </a:ext>
+            </a:extLst>
+          </p:cNvPr>
+          <p:cNvSpPr>
+            <a:spLocks noGrp="1"/>
+          </p:cNvSpPr>
+          <p:nvPr>
+            <p:ph type="subTitle" idx="1"/>
+          </p:nvPr>
+        </p:nvSpPr>
+        <p:spPr/>
+        <p:txBody>
+          <a:bodyPr/>
+          <a:lstStyle/>
+          <a:p>
+            <a:endParaRPr lang="en-US"/>
+          </a:p>
+        </p:txBody>
+      </p:sp>
+    </p:spTree>
+    <p:extLst>
+      <p:ext uri="{BB962C8B-B14F-4D97-AF65-F5344CB8AC3E}">
+        <p14:creationId xmlns:p14="http://schemas.microsoft.com/office/powerpoint/2010/main" val="171986201"/>
+      </p:ext>
+    </p:extLst>
+  </p:cSld>
+  <p:clrMapOvr>
+    <a:masterClrMapping/>
+  </p:clrMapOvr>
+</p:sld>
+</file>
+
+<file path=ppt/slides/slide18.xml><?xml version="1.0" encoding="utf-8"?>
+<p:sld xmlns:a="http://schemas.openxmlformats.org/drawingml/2006/main" xmlns:r="http://schemas.openxmlformats.org/officeDocument/2006/relationships" xmlns:p="http://schemas.openxmlformats.org/presentationml/2006/main">
+  <p:cSld>
+    <p:spTree>
+      <p:nvGrpSpPr>
+        <p:cNvPr id="1" name=""/>
+        <p:cNvGrpSpPr/>
+        <p:nvPr/>
+      </p:nvGrpSpPr>
+      <p:grpSpPr>
+        <a:xfrm>
+          <a:off x="0" y="0"/>
+          <a:ext cx="0" cy="0"/>
+          <a:chOff x="0" y="0"/>
+          <a:chExt cx="0" cy="0"/>
+        </a:xfrm>
+      </p:grpSpPr>
+      <p:sp>
+        <p:nvSpPr>
+          <p:cNvPr id="2" name="Title 1">
+            <a:extLst>
+              <a:ext uri="{FF2B5EF4-FFF2-40B4-BE49-F238E27FC236}">
+                <a16:creationId xmlns:a16="http://schemas.microsoft.com/office/drawing/2014/main" id="{BA022918-8E0A-4718-AC66-06EB82A9E56D}"/>
+              </a:ext>
+            </a:extLst>
+          </p:cNvPr>
+          <p:cNvSpPr>
+            <a:spLocks noGrp="1"/>
+          </p:cNvSpPr>
+          <p:nvPr>
+            <p:ph type="title"/>
+          </p:nvPr>
+        </p:nvSpPr>
+        <p:spPr/>
+        <p:txBody>
+          <a:bodyPr/>
+          <a:lstStyle/>
+          <a:p>
+            <a:r>
+              <a:rPr lang="en-US" dirty="0"/>
+              <a:t>PR predictor – training loss</a:t>
+            </a:r>
+          </a:p>
+        </p:txBody>
+      </p:sp>
+      <p:pic>
+        <p:nvPicPr>
+          <p:cNvPr id="6" name="Content Placeholder 5" descr="Shape&#10;&#10;Description automatically generated">
+            <a:extLst>
+              <a:ext uri="{FF2B5EF4-FFF2-40B4-BE49-F238E27FC236}">
+                <a16:creationId xmlns:a16="http://schemas.microsoft.com/office/drawing/2014/main" id="{27F65C52-0885-45F0-AF91-7B3AC9C90047}"/>
+              </a:ext>
+            </a:extLst>
+          </p:cNvPr>
+          <p:cNvPicPr>
+            <a:picLocks noGrp="1" noChangeAspect="1"/>
+          </p:cNvPicPr>
+          <p:nvPr>
+            <p:ph idx="1"/>
+          </p:nvPr>
+        </p:nvPicPr>
+        <p:blipFill>
+          <a:blip r:embed="rId2">
+            <a:extLst>
+              <a:ext uri="{28A0092B-C50C-407E-A947-70E740481C1C}">
+                <a14:useLocalDpi xmlns:a14="http://schemas.microsoft.com/office/drawing/2010/main" val="0"/>
+              </a:ext>
+            </a:extLst>
+          </a:blip>
+          <a:stretch>
+            <a:fillRect/>
+          </a:stretch>
+        </p:blipFill>
+        <p:spPr>
+          <a:xfrm>
+            <a:off x="729673" y="1527054"/>
+            <a:ext cx="10127946" cy="5157909"/>
+          </a:xfrm>
+        </p:spPr>
+      </p:pic>
+    </p:spTree>
+    <p:extLst>
+      <p:ext uri="{BB962C8B-B14F-4D97-AF65-F5344CB8AC3E}">
+        <p14:creationId xmlns:p14="http://schemas.microsoft.com/office/powerpoint/2010/main" val="2296370212"/>
+      </p:ext>
+    </p:extLst>
+  </p:cSld>
+  <p:clrMapOvr>
+    <a:masterClrMapping/>
+  </p:clrMapOvr>
+</p:sld>
+</file>
+
+<file path=ppt/slides/slide19.xml><?xml version="1.0" encoding="utf-8"?>
+<p:sld xmlns:a="http://schemas.openxmlformats.org/drawingml/2006/main" xmlns:r="http://schemas.openxmlformats.org/officeDocument/2006/relationships" xmlns:p="http://schemas.openxmlformats.org/presentationml/2006/main">
+  <p:cSld>
+    <p:spTree>
+      <p:nvGrpSpPr>
+        <p:cNvPr id="1" name=""/>
+        <p:cNvGrpSpPr/>
+        <p:nvPr/>
+      </p:nvGrpSpPr>
+      <p:grpSpPr>
+        <a:xfrm>
+          <a:off x="0" y="0"/>
+          <a:ext cx="0" cy="0"/>
+          <a:chOff x="0" y="0"/>
+          <a:chExt cx="0" cy="0"/>
+        </a:xfrm>
+      </p:grpSpPr>
+      <p:sp>
+        <p:nvSpPr>
+          <p:cNvPr id="2" name="Title 1">
+            <a:extLst>
+              <a:ext uri="{FF2B5EF4-FFF2-40B4-BE49-F238E27FC236}">
+                <a16:creationId xmlns:a16="http://schemas.microsoft.com/office/drawing/2014/main" id="{07EDA2B3-CC82-444B-A55E-D02559A5D5EA}"/>
+              </a:ext>
+            </a:extLst>
+          </p:cNvPr>
+          <p:cNvSpPr>
+            <a:spLocks noGrp="1"/>
+          </p:cNvSpPr>
+          <p:nvPr>
+            <p:ph type="title"/>
+          </p:nvPr>
+        </p:nvSpPr>
+        <p:spPr/>
+        <p:txBody>
+          <a:bodyPr/>
+          <a:lstStyle/>
+          <a:p>
+            <a:r>
+              <a:rPr lang="en-US" dirty="0"/>
+              <a:t>PR predictor - Pitch</a:t>
+            </a:r>
+          </a:p>
+        </p:txBody>
+      </p:sp>
+      <p:pic>
+        <p:nvPicPr>
+          <p:cNvPr id="7" name="Content Placeholder 6" descr="A picture containing plant&#10;&#10;Description automatically generated">
+            <a:extLst>
+              <a:ext uri="{FF2B5EF4-FFF2-40B4-BE49-F238E27FC236}">
+                <a16:creationId xmlns:a16="http://schemas.microsoft.com/office/drawing/2014/main" id="{CB653F85-37CD-4C88-81FC-E02E94A5F148}"/>
+              </a:ext>
+            </a:extLst>
+          </p:cNvPr>
+          <p:cNvPicPr>
+            <a:picLocks noGrp="1" noChangeAspect="1"/>
+          </p:cNvPicPr>
+          <p:nvPr>
+            <p:ph idx="1"/>
+          </p:nvPr>
+        </p:nvPicPr>
+        <p:blipFill>
+          <a:blip r:embed="rId2">
+            <a:extLst>
+              <a:ext uri="{28A0092B-C50C-407E-A947-70E740481C1C}">
+                <a14:useLocalDpi xmlns:a14="http://schemas.microsoft.com/office/drawing/2010/main" val="0"/>
+              </a:ext>
+            </a:extLst>
+          </a:blip>
+          <a:stretch>
+            <a:fillRect/>
+          </a:stretch>
+        </p:blipFill>
+        <p:spPr>
+          <a:xfrm>
+            <a:off x="1863531" y="1825625"/>
+            <a:ext cx="8464937" cy="4351338"/>
+          </a:xfrm>
+        </p:spPr>
+      </p:pic>
+    </p:spTree>
+    <p:extLst>
+      <p:ext uri="{BB962C8B-B14F-4D97-AF65-F5344CB8AC3E}">
+        <p14:creationId xmlns:p14="http://schemas.microsoft.com/office/powerpoint/2010/main" val="1362276181"/>
       </p:ext>
     </p:extLst>
   </p:cSld>
@@ -3509,7 +4536,7 @@
           <p:cNvPr id="2" name="Title 1">
             <a:extLst>
               <a:ext uri="{FF2B5EF4-FFF2-40B4-BE49-F238E27FC236}">
-                <a16:creationId xmlns:a16="http://schemas.microsoft.com/office/drawing/2014/main" id="{E0C99628-6D05-4E50-967C-BD6AB7EAC16D}"/>
+                <a16:creationId xmlns:a16="http://schemas.microsoft.com/office/drawing/2014/main" id="{B413C18E-B0A1-44F7-9ABA-E6D50B67393A}"/>
               </a:ext>
             </a:extLst>
           </p:cNvPr>
@@ -3527,7 +4554,7 @@
           <a:p>
             <a:r>
               <a:rPr lang="en-US" dirty="0"/>
-              <a:t>LSTM model to predict PR</a:t>
+              <a:t>Models</a:t>
             </a:r>
           </a:p>
         </p:txBody>
@@ -3537,7 +4564,7 @@
           <p:cNvPr id="3" name="Content Placeholder 2">
             <a:extLst>
               <a:ext uri="{FF2B5EF4-FFF2-40B4-BE49-F238E27FC236}">
-                <a16:creationId xmlns:a16="http://schemas.microsoft.com/office/drawing/2014/main" id="{87C38115-DA69-4933-93A1-084BC4408424}"/>
+                <a16:creationId xmlns:a16="http://schemas.microsoft.com/office/drawing/2014/main" id="{F553305B-EA01-4AAA-891C-FC74CF10C52E}"/>
               </a:ext>
             </a:extLst>
           </p:cNvPr>
@@ -3555,33 +4582,904 @@
           <a:p>
             <a:r>
               <a:rPr lang="en-US" dirty="0"/>
-              <a:t>2 Stacked LSTM</a:t>
-            </a:r>
-          </a:p>
-          <a:p>
-            <a:r>
-              <a:rPr lang="en-US" dirty="0"/>
-              <a:t>128 hidden layers</a:t>
-            </a:r>
-          </a:p>
-          <a:p>
-            <a:r>
-              <a:rPr lang="en-US" dirty="0"/>
-              <a:t>8 epochs</a:t>
-            </a:r>
-          </a:p>
-          <a:p>
-            <a:r>
-              <a:rPr lang="en-US" dirty="0"/>
-              <a:t>64 batch size</a:t>
-            </a:r>
+              <a:t>50x2 inputs of P &amp; R -&gt; 1x1 output: P</a:t>
+            </a:r>
+          </a:p>
+          <a:p>
+            <a:r>
+              <a:rPr lang="en-US" dirty="0"/>
+              <a:t>50x2 inputs of P &amp; R -&gt; 1x1 output: R</a:t>
+            </a:r>
+          </a:p>
+          <a:p>
+            <a:r>
+              <a:rPr lang="en-US" dirty="0"/>
+              <a:t>50x2 inputs of P &amp; R -&gt; 1x2 outputs: P &amp; R</a:t>
+            </a:r>
+          </a:p>
+          <a:p>
+            <a:r>
+              <a:rPr lang="en-US" dirty="0"/>
+              <a:t>10x2 inputs of P &amp; R -&gt; 1x2 outputs: P &amp; R</a:t>
+            </a:r>
+          </a:p>
+          <a:p>
+            <a:r>
+              <a:rPr lang="en-US" dirty="0"/>
+              <a:t>30x2 inputs of P &amp; R -&gt; 10x2 outputs P&amp; R</a:t>
+            </a:r>
+          </a:p>
+          <a:p>
+            <a:endParaRPr lang="en-US" dirty="0"/>
+          </a:p>
+          <a:p>
+            <a:endParaRPr lang="en-US" dirty="0"/>
+          </a:p>
+          <a:p>
+            <a:endParaRPr lang="en-US" dirty="0"/>
           </a:p>
         </p:txBody>
       </p:sp>
     </p:spTree>
     <p:extLst>
       <p:ext uri="{BB962C8B-B14F-4D97-AF65-F5344CB8AC3E}">
-        <p14:creationId xmlns:p14="http://schemas.microsoft.com/office/powerpoint/2010/main" val="2108347234"/>
+        <p14:creationId xmlns:p14="http://schemas.microsoft.com/office/powerpoint/2010/main" val="3380106483"/>
+      </p:ext>
+    </p:extLst>
+  </p:cSld>
+  <p:clrMapOvr>
+    <a:masterClrMapping/>
+  </p:clrMapOvr>
+</p:sld>
+</file>
+
+<file path=ppt/slides/slide20.xml><?xml version="1.0" encoding="utf-8"?>
+<p:sld xmlns:a="http://schemas.openxmlformats.org/drawingml/2006/main" xmlns:r="http://schemas.openxmlformats.org/officeDocument/2006/relationships" xmlns:p="http://schemas.openxmlformats.org/presentationml/2006/main">
+  <p:cSld>
+    <p:spTree>
+      <p:nvGrpSpPr>
+        <p:cNvPr id="1" name=""/>
+        <p:cNvGrpSpPr/>
+        <p:nvPr/>
+      </p:nvGrpSpPr>
+      <p:grpSpPr>
+        <a:xfrm>
+          <a:off x="0" y="0"/>
+          <a:ext cx="0" cy="0"/>
+          <a:chOff x="0" y="0"/>
+          <a:chExt cx="0" cy="0"/>
+        </a:xfrm>
+      </p:grpSpPr>
+      <p:sp>
+        <p:nvSpPr>
+          <p:cNvPr id="2" name="Title 1">
+            <a:extLst>
+              <a:ext uri="{FF2B5EF4-FFF2-40B4-BE49-F238E27FC236}">
+                <a16:creationId xmlns:a16="http://schemas.microsoft.com/office/drawing/2014/main" id="{07EDA2B3-CC82-444B-A55E-D02559A5D5EA}"/>
+              </a:ext>
+            </a:extLst>
+          </p:cNvPr>
+          <p:cNvSpPr>
+            <a:spLocks noGrp="1"/>
+          </p:cNvSpPr>
+          <p:nvPr>
+            <p:ph type="title"/>
+          </p:nvPr>
+        </p:nvSpPr>
+        <p:spPr/>
+        <p:txBody>
+          <a:bodyPr/>
+          <a:lstStyle/>
+          <a:p>
+            <a:r>
+              <a:rPr lang="en-US" dirty="0"/>
+              <a:t>PR predictor - Pitch</a:t>
+            </a:r>
+          </a:p>
+        </p:txBody>
+      </p:sp>
+      <p:sp>
+        <p:nvSpPr>
+          <p:cNvPr id="3" name="Content Placeholder 2">
+            <a:extLst>
+              <a:ext uri="{FF2B5EF4-FFF2-40B4-BE49-F238E27FC236}">
+                <a16:creationId xmlns:a16="http://schemas.microsoft.com/office/drawing/2014/main" id="{0C4ACD3F-9085-46CD-8AEA-A9403BCA76F7}"/>
+              </a:ext>
+            </a:extLst>
+          </p:cNvPr>
+          <p:cNvSpPr>
+            <a:spLocks noGrp="1"/>
+          </p:cNvSpPr>
+          <p:nvPr>
+            <p:ph idx="1"/>
+          </p:nvPr>
+        </p:nvSpPr>
+        <p:spPr/>
+        <p:txBody>
+          <a:bodyPr>
+            <a:normAutofit/>
+          </a:bodyPr>
+          <a:lstStyle/>
+          <a:p>
+            <a:r>
+              <a:rPr lang="en-US" dirty="0"/>
+              <a:t>Real prediction</a:t>
+            </a:r>
+          </a:p>
+          <a:p>
+            <a:pPr lvl="1"/>
+            <a:r>
+              <a:rPr lang="en-US" dirty="0"/>
+              <a:t>RMSE </a:t>
+            </a:r>
+            <a:r>
+              <a:rPr lang="en-US" dirty="0" err="1"/>
+              <a:t>denorm</a:t>
+            </a:r>
+            <a:r>
+              <a:rPr lang="en-US" dirty="0"/>
+              <a:t>: 2.34°</a:t>
+            </a:r>
+          </a:p>
+          <a:p>
+            <a:r>
+              <a:rPr lang="en-US" dirty="0"/>
+              <a:t>Zero prediction</a:t>
+            </a:r>
+          </a:p>
+          <a:p>
+            <a:pPr lvl="1"/>
+            <a:r>
+              <a:rPr lang="en-US" dirty="0"/>
+              <a:t>RMSE 0 </a:t>
+            </a:r>
+            <a:r>
+              <a:rPr lang="en-US" dirty="0" err="1"/>
+              <a:t>denorm</a:t>
+            </a:r>
+            <a:r>
+              <a:rPr lang="en-US" dirty="0"/>
+              <a:t>: 6.55°</a:t>
+            </a:r>
+          </a:p>
+          <a:p>
+            <a:r>
+              <a:rPr lang="en-US" dirty="0"/>
+              <a:t>Improvement on zero prediction:</a:t>
+            </a:r>
+          </a:p>
+          <a:p>
+            <a:pPr lvl="1"/>
+            <a:r>
+              <a:rPr lang="en-US" dirty="0"/>
+              <a:t>RMSE delta%: 	279.74 %</a:t>
+            </a:r>
+          </a:p>
+        </p:txBody>
+      </p:sp>
+    </p:spTree>
+    <p:extLst>
+      <p:ext uri="{BB962C8B-B14F-4D97-AF65-F5344CB8AC3E}">
+        <p14:creationId xmlns:p14="http://schemas.microsoft.com/office/powerpoint/2010/main" val="4017007627"/>
+      </p:ext>
+    </p:extLst>
+  </p:cSld>
+  <p:clrMapOvr>
+    <a:masterClrMapping/>
+  </p:clrMapOvr>
+</p:sld>
+</file>
+
+<file path=ppt/slides/slide21.xml><?xml version="1.0" encoding="utf-8"?>
+<p:sld xmlns:a="http://schemas.openxmlformats.org/drawingml/2006/main" xmlns:r="http://schemas.openxmlformats.org/officeDocument/2006/relationships" xmlns:p="http://schemas.openxmlformats.org/presentationml/2006/main">
+  <p:cSld>
+    <p:spTree>
+      <p:nvGrpSpPr>
+        <p:cNvPr id="1" name=""/>
+        <p:cNvGrpSpPr/>
+        <p:nvPr/>
+      </p:nvGrpSpPr>
+      <p:grpSpPr>
+        <a:xfrm>
+          <a:off x="0" y="0"/>
+          <a:ext cx="0" cy="0"/>
+          <a:chOff x="0" y="0"/>
+          <a:chExt cx="0" cy="0"/>
+        </a:xfrm>
+      </p:grpSpPr>
+      <p:sp>
+        <p:nvSpPr>
+          <p:cNvPr id="2" name="Title 1">
+            <a:extLst>
+              <a:ext uri="{FF2B5EF4-FFF2-40B4-BE49-F238E27FC236}">
+                <a16:creationId xmlns:a16="http://schemas.microsoft.com/office/drawing/2014/main" id="{8E64FC6F-F3DE-4E70-B5CD-BCDAC34D6F31}"/>
+              </a:ext>
+            </a:extLst>
+          </p:cNvPr>
+          <p:cNvSpPr>
+            <a:spLocks noGrp="1"/>
+          </p:cNvSpPr>
+          <p:nvPr>
+            <p:ph type="title"/>
+          </p:nvPr>
+        </p:nvSpPr>
+        <p:spPr/>
+        <p:txBody>
+          <a:bodyPr/>
+          <a:lstStyle/>
+          <a:p>
+            <a:r>
+              <a:rPr lang="en-US" dirty="0"/>
+              <a:t>PR predictor – Roll</a:t>
+            </a:r>
+          </a:p>
+        </p:txBody>
+      </p:sp>
+      <p:pic>
+        <p:nvPicPr>
+          <p:cNvPr id="7" name="Content Placeholder 6" descr="Chart&#10;&#10;Description automatically generated">
+            <a:extLst>
+              <a:ext uri="{FF2B5EF4-FFF2-40B4-BE49-F238E27FC236}">
+                <a16:creationId xmlns:a16="http://schemas.microsoft.com/office/drawing/2014/main" id="{E1BDAEF9-6606-4A67-AF0F-168FEF8E3380}"/>
+              </a:ext>
+            </a:extLst>
+          </p:cNvPr>
+          <p:cNvPicPr>
+            <a:picLocks noGrp="1" noChangeAspect="1"/>
+          </p:cNvPicPr>
+          <p:nvPr>
+            <p:ph idx="1"/>
+          </p:nvPr>
+        </p:nvPicPr>
+        <p:blipFill>
+          <a:blip r:embed="rId2">
+            <a:extLst>
+              <a:ext uri="{28A0092B-C50C-407E-A947-70E740481C1C}">
+                <a14:useLocalDpi xmlns:a14="http://schemas.microsoft.com/office/drawing/2010/main" val="0"/>
+              </a:ext>
+            </a:extLst>
+          </a:blip>
+          <a:stretch>
+            <a:fillRect/>
+          </a:stretch>
+        </p:blipFill>
+        <p:spPr>
+          <a:xfrm>
+            <a:off x="1863531" y="1825625"/>
+            <a:ext cx="8464937" cy="4351338"/>
+          </a:xfrm>
+        </p:spPr>
+      </p:pic>
+    </p:spTree>
+    <p:extLst>
+      <p:ext uri="{BB962C8B-B14F-4D97-AF65-F5344CB8AC3E}">
+        <p14:creationId xmlns:p14="http://schemas.microsoft.com/office/powerpoint/2010/main" val="1537690751"/>
+      </p:ext>
+    </p:extLst>
+  </p:cSld>
+  <p:clrMapOvr>
+    <a:masterClrMapping/>
+  </p:clrMapOvr>
+</p:sld>
+</file>
+
+<file path=ppt/slides/slide22.xml><?xml version="1.0" encoding="utf-8"?>
+<p:sld xmlns:a="http://schemas.openxmlformats.org/drawingml/2006/main" xmlns:r="http://schemas.openxmlformats.org/officeDocument/2006/relationships" xmlns:p="http://schemas.openxmlformats.org/presentationml/2006/main">
+  <p:cSld>
+    <p:spTree>
+      <p:nvGrpSpPr>
+        <p:cNvPr id="1" name=""/>
+        <p:cNvGrpSpPr/>
+        <p:nvPr/>
+      </p:nvGrpSpPr>
+      <p:grpSpPr>
+        <a:xfrm>
+          <a:off x="0" y="0"/>
+          <a:ext cx="0" cy="0"/>
+          <a:chOff x="0" y="0"/>
+          <a:chExt cx="0" cy="0"/>
+        </a:xfrm>
+      </p:grpSpPr>
+      <p:sp>
+        <p:nvSpPr>
+          <p:cNvPr id="2" name="Title 1">
+            <a:extLst>
+              <a:ext uri="{FF2B5EF4-FFF2-40B4-BE49-F238E27FC236}">
+                <a16:creationId xmlns:a16="http://schemas.microsoft.com/office/drawing/2014/main" id="{8E64FC6F-F3DE-4E70-B5CD-BCDAC34D6F31}"/>
+              </a:ext>
+            </a:extLst>
+          </p:cNvPr>
+          <p:cNvSpPr>
+            <a:spLocks noGrp="1"/>
+          </p:cNvSpPr>
+          <p:nvPr>
+            <p:ph type="title"/>
+          </p:nvPr>
+        </p:nvSpPr>
+        <p:spPr/>
+        <p:txBody>
+          <a:bodyPr/>
+          <a:lstStyle/>
+          <a:p>
+            <a:r>
+              <a:rPr lang="en-US" dirty="0"/>
+              <a:t>PR predictor – Roll</a:t>
+            </a:r>
+          </a:p>
+        </p:txBody>
+      </p:sp>
+      <p:sp>
+        <p:nvSpPr>
+          <p:cNvPr id="3" name="Content Placeholder 2">
+            <a:extLst>
+              <a:ext uri="{FF2B5EF4-FFF2-40B4-BE49-F238E27FC236}">
+                <a16:creationId xmlns:a16="http://schemas.microsoft.com/office/drawing/2014/main" id="{969FBA46-760F-485A-B4AE-9054DD48BCC5}"/>
+              </a:ext>
+            </a:extLst>
+          </p:cNvPr>
+          <p:cNvSpPr>
+            <a:spLocks noGrp="1"/>
+          </p:cNvSpPr>
+          <p:nvPr>
+            <p:ph idx="1"/>
+          </p:nvPr>
+        </p:nvSpPr>
+        <p:spPr/>
+        <p:txBody>
+          <a:bodyPr>
+            <a:normAutofit/>
+          </a:bodyPr>
+          <a:lstStyle/>
+          <a:p>
+            <a:r>
+              <a:rPr lang="en-US" dirty="0"/>
+              <a:t>Real prediction</a:t>
+            </a:r>
+          </a:p>
+          <a:p>
+            <a:pPr lvl="1"/>
+            <a:r>
+              <a:rPr lang="en-US" dirty="0"/>
+              <a:t>RMSE </a:t>
+            </a:r>
+            <a:r>
+              <a:rPr lang="en-US" dirty="0" err="1"/>
+              <a:t>denorm</a:t>
+            </a:r>
+            <a:r>
+              <a:rPr lang="en-US" dirty="0"/>
+              <a:t>: 2.09°</a:t>
+            </a:r>
+          </a:p>
+          <a:p>
+            <a:r>
+              <a:rPr lang="en-US" dirty="0"/>
+              <a:t>Zero prediction</a:t>
+            </a:r>
+          </a:p>
+          <a:p>
+            <a:pPr lvl="1"/>
+            <a:r>
+              <a:rPr lang="en-US" dirty="0"/>
+              <a:t>RMSE 0 </a:t>
+            </a:r>
+            <a:r>
+              <a:rPr lang="en-US" dirty="0" err="1"/>
+              <a:t>denorm</a:t>
+            </a:r>
+            <a:r>
+              <a:rPr lang="en-US" dirty="0"/>
+              <a:t>: 7.08°</a:t>
+            </a:r>
+          </a:p>
+          <a:p>
+            <a:r>
+              <a:rPr lang="en-US" dirty="0"/>
+              <a:t>Improvement on zero prediction:</a:t>
+            </a:r>
+          </a:p>
+          <a:p>
+            <a:pPr lvl="1"/>
+            <a:r>
+              <a:rPr lang="en-US" dirty="0"/>
+              <a:t>RMSE delta%:	338.67 %</a:t>
+            </a:r>
+          </a:p>
+        </p:txBody>
+      </p:sp>
+    </p:spTree>
+    <p:extLst>
+      <p:ext uri="{BB962C8B-B14F-4D97-AF65-F5344CB8AC3E}">
+        <p14:creationId xmlns:p14="http://schemas.microsoft.com/office/powerpoint/2010/main" val="4152632249"/>
+      </p:ext>
+    </p:extLst>
+  </p:cSld>
+  <p:clrMapOvr>
+    <a:masterClrMapping/>
+  </p:clrMapOvr>
+</p:sld>
+</file>
+
+<file path=ppt/slides/slide23.xml><?xml version="1.0" encoding="utf-8"?>
+<p:sld xmlns:a="http://schemas.openxmlformats.org/drawingml/2006/main" xmlns:r="http://schemas.openxmlformats.org/officeDocument/2006/relationships" xmlns:p="http://schemas.openxmlformats.org/presentationml/2006/main">
+  <p:cSld>
+    <p:spTree>
+      <p:nvGrpSpPr>
+        <p:cNvPr id="1" name=""/>
+        <p:cNvGrpSpPr/>
+        <p:nvPr/>
+      </p:nvGrpSpPr>
+      <p:grpSpPr>
+        <a:xfrm>
+          <a:off x="0" y="0"/>
+          <a:ext cx="0" cy="0"/>
+          <a:chOff x="0" y="0"/>
+          <a:chExt cx="0" cy="0"/>
+        </a:xfrm>
+      </p:grpSpPr>
+      <p:sp>
+        <p:nvSpPr>
+          <p:cNvPr id="2" name="Title 1">
+            <a:extLst>
+              <a:ext uri="{FF2B5EF4-FFF2-40B4-BE49-F238E27FC236}">
+                <a16:creationId xmlns:a16="http://schemas.microsoft.com/office/drawing/2014/main" id="{0960D489-B3A3-40F2-BC39-C409B00DF3B4}"/>
+              </a:ext>
+            </a:extLst>
+          </p:cNvPr>
+          <p:cNvSpPr>
+            <a:spLocks noGrp="1"/>
+          </p:cNvSpPr>
+          <p:nvPr>
+            <p:ph type="title"/>
+          </p:nvPr>
+        </p:nvSpPr>
+        <p:spPr/>
+        <p:txBody>
+          <a:bodyPr/>
+          <a:lstStyle/>
+          <a:p>
+            <a:r>
+              <a:rPr lang="en-US" dirty="0"/>
+              <a:t>Results</a:t>
+            </a:r>
+          </a:p>
+        </p:txBody>
+      </p:sp>
+      <p:graphicFrame>
+        <p:nvGraphicFramePr>
+          <p:cNvPr id="4" name="Table 4">
+            <a:extLst>
+              <a:ext uri="{FF2B5EF4-FFF2-40B4-BE49-F238E27FC236}">
+                <a16:creationId xmlns:a16="http://schemas.microsoft.com/office/drawing/2014/main" id="{A11B2FB1-1423-4ECB-B31E-B922FDDD1305}"/>
+              </a:ext>
+            </a:extLst>
+          </p:cNvPr>
+          <p:cNvGraphicFramePr>
+            <a:graphicFrameLocks noGrp="1"/>
+          </p:cNvGraphicFramePr>
+          <p:nvPr>
+            <p:ph idx="1"/>
+            <p:extLst>
+              <p:ext uri="{D42A27DB-BD31-4B8C-83A1-F6EECF244321}">
+                <p14:modId xmlns:p14="http://schemas.microsoft.com/office/powerpoint/2010/main" val="1212844242"/>
+              </p:ext>
+            </p:extLst>
+          </p:nvPr>
+        </p:nvGraphicFramePr>
+        <p:xfrm>
+          <a:off x="838200" y="1825624"/>
+          <a:ext cx="10689771" cy="2289175"/>
+        </p:xfrm>
+        <a:graphic>
+          <a:graphicData uri="http://schemas.openxmlformats.org/drawingml/2006/table">
+            <a:tbl>
+              <a:tblPr firstRow="1" bandRow="1">
+                <a:tableStyleId>{5C22544A-7EE6-4342-B048-85BDC9FD1C3A}</a:tableStyleId>
+              </a:tblPr>
+              <a:tblGrid>
+                <a:gridCol w="3563257">
+                  <a:extLst>
+                    <a:ext uri="{9D8B030D-6E8A-4147-A177-3AD203B41FA5}">
+                      <a16:colId xmlns:a16="http://schemas.microsoft.com/office/drawing/2014/main" val="2876378698"/>
+                    </a:ext>
+                  </a:extLst>
+                </a:gridCol>
+                <a:gridCol w="3563257">
+                  <a:extLst>
+                    <a:ext uri="{9D8B030D-6E8A-4147-A177-3AD203B41FA5}">
+                      <a16:colId xmlns:a16="http://schemas.microsoft.com/office/drawing/2014/main" val="3699546664"/>
+                    </a:ext>
+                  </a:extLst>
+                </a:gridCol>
+                <a:gridCol w="3563257">
+                  <a:extLst>
+                    <a:ext uri="{9D8B030D-6E8A-4147-A177-3AD203B41FA5}">
+                      <a16:colId xmlns:a16="http://schemas.microsoft.com/office/drawing/2014/main" val="2019034020"/>
+                    </a:ext>
+                  </a:extLst>
+                </a:gridCol>
+              </a:tblGrid>
+              <a:tr h="457835">
+                <a:tc>
+                  <a:txBody>
+                    <a:bodyPr/>
+                    <a:lstStyle/>
+                    <a:p>
+                      <a:r>
+                        <a:rPr lang="en-US" dirty="0"/>
+                        <a:t>MODEL (in -&gt;  out)</a:t>
+                      </a:r>
+                    </a:p>
+                  </a:txBody>
+                  <a:tcPr/>
+                </a:tc>
+                <a:tc>
+                  <a:txBody>
+                    <a:bodyPr/>
+                    <a:lstStyle/>
+                    <a:p>
+                      <a:r>
+                        <a:rPr lang="en-US" dirty="0"/>
+                        <a:t>PITCH (denormalized RMSE)</a:t>
+                      </a:r>
+                    </a:p>
+                  </a:txBody>
+                  <a:tcPr/>
+                </a:tc>
+                <a:tc>
+                  <a:txBody>
+                    <a:bodyPr/>
+                    <a:lstStyle/>
+                    <a:p>
+                      <a:r>
+                        <a:rPr lang="en-US" dirty="0"/>
+                        <a:t>ROLL (denormalized RMSE)</a:t>
+                      </a:r>
+                    </a:p>
+                  </a:txBody>
+                  <a:tcPr/>
+                </a:tc>
+                <a:extLst>
+                  <a:ext uri="{0D108BD9-81ED-4DB2-BD59-A6C34878D82A}">
+                    <a16:rowId xmlns:a16="http://schemas.microsoft.com/office/drawing/2014/main" val="607570848"/>
+                  </a:ext>
+                </a:extLst>
+              </a:tr>
+              <a:tr h="457835">
+                <a:tc>
+                  <a:txBody>
+                    <a:bodyPr/>
+                    <a:lstStyle/>
+                    <a:p>
+                      <a:r>
+                        <a:rPr lang="en-US" dirty="0"/>
+                        <a:t>50x2 PR -&gt; 1x1 Pitch</a:t>
+                      </a:r>
+                    </a:p>
+                  </a:txBody>
+                  <a:tcPr/>
+                </a:tc>
+                <a:tc>
+                  <a:txBody>
+                    <a:bodyPr/>
+                    <a:lstStyle/>
+                    <a:p>
+                      <a:r>
+                        <a:rPr lang="en-US" dirty="0"/>
+                        <a:t>4.69°</a:t>
+                      </a:r>
+                    </a:p>
+                  </a:txBody>
+                  <a:tcPr/>
+                </a:tc>
+                <a:tc>
+                  <a:txBody>
+                    <a:bodyPr/>
+                    <a:lstStyle/>
+                    <a:p>
+                      <a:r>
+                        <a:rPr lang="en-US" dirty="0"/>
+                        <a:t>/</a:t>
+                      </a:r>
+                    </a:p>
+                  </a:txBody>
+                  <a:tcPr/>
+                </a:tc>
+                <a:extLst>
+                  <a:ext uri="{0D108BD9-81ED-4DB2-BD59-A6C34878D82A}">
+                    <a16:rowId xmlns:a16="http://schemas.microsoft.com/office/drawing/2014/main" val="1645735034"/>
+                  </a:ext>
+                </a:extLst>
+              </a:tr>
+              <a:tr h="457835">
+                <a:tc>
+                  <a:txBody>
+                    <a:bodyPr/>
+                    <a:lstStyle/>
+                    <a:p>
+                      <a:pPr marL="0" marR="0" lvl="0" indent="0" algn="l" defTabSz="914400" rtl="0" eaLnBrk="1" fontAlgn="auto" latinLnBrk="0" hangingPunct="1">
+                        <a:lnSpc>
+                          <a:spcPct val="100000"/>
+                        </a:lnSpc>
+                        <a:spcBef>
+                          <a:spcPts val="0"/>
+                        </a:spcBef>
+                        <a:spcAft>
+                          <a:spcPts val="0"/>
+                        </a:spcAft>
+                        <a:buClrTx/>
+                        <a:buSzTx/>
+                        <a:buFontTx/>
+                        <a:buNone/>
+                        <a:tabLst/>
+                        <a:defRPr/>
+                      </a:pPr>
+                      <a:r>
+                        <a:rPr lang="en-US" dirty="0"/>
+                        <a:t>50x2 PR -&gt; 1x1 Roll</a:t>
+                      </a:r>
+                    </a:p>
+                  </a:txBody>
+                  <a:tcPr/>
+                </a:tc>
+                <a:tc>
+                  <a:txBody>
+                    <a:bodyPr/>
+                    <a:lstStyle/>
+                    <a:p>
+                      <a:r>
+                        <a:rPr lang="en-US" dirty="0"/>
+                        <a:t>/</a:t>
+                      </a:r>
+                    </a:p>
+                  </a:txBody>
+                  <a:tcPr/>
+                </a:tc>
+                <a:tc>
+                  <a:txBody>
+                    <a:bodyPr/>
+                    <a:lstStyle/>
+                    <a:p>
+                      <a:r>
+                        <a:rPr lang="en-US" dirty="0"/>
+                        <a:t>3.76°</a:t>
+                      </a:r>
+                    </a:p>
+                  </a:txBody>
+                  <a:tcPr/>
+                </a:tc>
+                <a:extLst>
+                  <a:ext uri="{0D108BD9-81ED-4DB2-BD59-A6C34878D82A}">
+                    <a16:rowId xmlns:a16="http://schemas.microsoft.com/office/drawing/2014/main" val="359746648"/>
+                  </a:ext>
+                </a:extLst>
+              </a:tr>
+              <a:tr h="457835">
+                <a:tc>
+                  <a:txBody>
+                    <a:bodyPr/>
+                    <a:lstStyle/>
+                    <a:p>
+                      <a:pPr marL="0" marR="0" lvl="0" indent="0" algn="l" defTabSz="914400" rtl="0" eaLnBrk="1" fontAlgn="auto" latinLnBrk="0" hangingPunct="1">
+                        <a:lnSpc>
+                          <a:spcPct val="100000"/>
+                        </a:lnSpc>
+                        <a:spcBef>
+                          <a:spcPts val="0"/>
+                        </a:spcBef>
+                        <a:spcAft>
+                          <a:spcPts val="0"/>
+                        </a:spcAft>
+                        <a:buClrTx/>
+                        <a:buSzTx/>
+                        <a:buFontTx/>
+                        <a:buNone/>
+                        <a:tabLst/>
+                        <a:defRPr/>
+                      </a:pPr>
+                      <a:r>
+                        <a:rPr lang="en-US" dirty="0"/>
+                        <a:t>50x2 PR -&gt; 1x2 PR </a:t>
+                      </a:r>
+                    </a:p>
+                  </a:txBody>
+                  <a:tcPr/>
+                </a:tc>
+                <a:tc>
+                  <a:txBody>
+                    <a:bodyPr/>
+                    <a:lstStyle/>
+                    <a:p>
+                      <a:r>
+                        <a:rPr lang="en-US" dirty="0"/>
+                        <a:t>2.17°</a:t>
+                      </a:r>
+                    </a:p>
+                  </a:txBody>
+                  <a:tcPr/>
+                </a:tc>
+                <a:tc>
+                  <a:txBody>
+                    <a:bodyPr/>
+                    <a:lstStyle/>
+                    <a:p>
+                      <a:r>
+                        <a:rPr lang="en-US" dirty="0"/>
+                        <a:t>2.03°</a:t>
+                      </a:r>
+                    </a:p>
+                  </a:txBody>
+                  <a:tcPr/>
+                </a:tc>
+                <a:extLst>
+                  <a:ext uri="{0D108BD9-81ED-4DB2-BD59-A6C34878D82A}">
+                    <a16:rowId xmlns:a16="http://schemas.microsoft.com/office/drawing/2014/main" val="3977967355"/>
+                  </a:ext>
+                </a:extLst>
+              </a:tr>
+              <a:tr h="457835">
+                <a:tc>
+                  <a:txBody>
+                    <a:bodyPr/>
+                    <a:lstStyle/>
+                    <a:p>
+                      <a:pPr marL="0" marR="0" lvl="0" indent="0" algn="l" defTabSz="914400" rtl="0" eaLnBrk="1" fontAlgn="auto" latinLnBrk="0" hangingPunct="1">
+                        <a:lnSpc>
+                          <a:spcPct val="100000"/>
+                        </a:lnSpc>
+                        <a:spcBef>
+                          <a:spcPts val="0"/>
+                        </a:spcBef>
+                        <a:spcAft>
+                          <a:spcPts val="0"/>
+                        </a:spcAft>
+                        <a:buClrTx/>
+                        <a:buSzTx/>
+                        <a:buFontTx/>
+                        <a:buNone/>
+                        <a:tabLst/>
+                        <a:defRPr/>
+                      </a:pPr>
+                      <a:r>
+                        <a:rPr lang="en-US" dirty="0"/>
+                        <a:t>10x2 PR -&gt; 1x2 PR </a:t>
+                      </a:r>
+                    </a:p>
+                  </a:txBody>
+                  <a:tcPr/>
+                </a:tc>
+                <a:tc>
+                  <a:txBody>
+                    <a:bodyPr/>
+                    <a:lstStyle/>
+                    <a:p>
+                      <a:r>
+                        <a:rPr lang="en-US" dirty="0"/>
+                        <a:t>2.34°</a:t>
+                      </a:r>
+                    </a:p>
+                  </a:txBody>
+                  <a:tcPr/>
+                </a:tc>
+                <a:tc>
+                  <a:txBody>
+                    <a:bodyPr/>
+                    <a:lstStyle/>
+                    <a:p>
+                      <a:r>
+                        <a:rPr lang="en-US" dirty="0"/>
+                        <a:t>2.09°</a:t>
+                      </a:r>
+                    </a:p>
+                  </a:txBody>
+                  <a:tcPr/>
+                </a:tc>
+                <a:extLst>
+                  <a:ext uri="{0D108BD9-81ED-4DB2-BD59-A6C34878D82A}">
+                    <a16:rowId xmlns:a16="http://schemas.microsoft.com/office/drawing/2014/main" val="2392973461"/>
+                  </a:ext>
+                </a:extLst>
+              </a:tr>
+            </a:tbl>
+          </a:graphicData>
+        </a:graphic>
+      </p:graphicFrame>
+    </p:spTree>
+    <p:extLst>
+      <p:ext uri="{BB962C8B-B14F-4D97-AF65-F5344CB8AC3E}">
+        <p14:creationId xmlns:p14="http://schemas.microsoft.com/office/powerpoint/2010/main" val="3686862585"/>
+      </p:ext>
+    </p:extLst>
+  </p:cSld>
+  <p:clrMapOvr>
+    <a:masterClrMapping/>
+  </p:clrMapOvr>
+</p:sld>
+</file>
+
+<file path=ppt/slides/slide24.xml><?xml version="1.0" encoding="utf-8"?>
+<p:sld xmlns:a="http://schemas.openxmlformats.org/drawingml/2006/main" xmlns:r="http://schemas.openxmlformats.org/officeDocument/2006/relationships" xmlns:p="http://schemas.openxmlformats.org/presentationml/2006/main">
+  <p:cSld>
+    <p:spTree>
+      <p:nvGrpSpPr>
+        <p:cNvPr id="1" name=""/>
+        <p:cNvGrpSpPr/>
+        <p:nvPr/>
+      </p:nvGrpSpPr>
+      <p:grpSpPr>
+        <a:xfrm>
+          <a:off x="0" y="0"/>
+          <a:ext cx="0" cy="0"/>
+          <a:chOff x="0" y="0"/>
+          <a:chExt cx="0" cy="0"/>
+        </a:xfrm>
+      </p:grpSpPr>
+      <p:sp>
+        <p:nvSpPr>
+          <p:cNvPr id="2" name="Title 1">
+            <a:extLst>
+              <a:ext uri="{FF2B5EF4-FFF2-40B4-BE49-F238E27FC236}">
+                <a16:creationId xmlns:a16="http://schemas.microsoft.com/office/drawing/2014/main" id="{186D901E-75D7-4C61-8188-A873E73FDD93}"/>
+              </a:ext>
+            </a:extLst>
+          </p:cNvPr>
+          <p:cNvSpPr>
+            <a:spLocks noGrp="1"/>
+          </p:cNvSpPr>
+          <p:nvPr>
+            <p:ph type="title"/>
+          </p:nvPr>
+        </p:nvSpPr>
+        <p:spPr/>
+        <p:txBody>
+          <a:bodyPr/>
+          <a:lstStyle/>
+          <a:p>
+            <a:r>
+              <a:rPr lang="en-US" dirty="0"/>
+              <a:t>Plato thesis title</a:t>
+            </a:r>
+          </a:p>
+        </p:txBody>
+      </p:sp>
+      <p:sp>
+        <p:nvSpPr>
+          <p:cNvPr id="3" name="Content Placeholder 2">
+            <a:extLst>
+              <a:ext uri="{FF2B5EF4-FFF2-40B4-BE49-F238E27FC236}">
+                <a16:creationId xmlns:a16="http://schemas.microsoft.com/office/drawing/2014/main" id="{D3BB3BBB-B163-470C-841A-BFD3DFDF56FC}"/>
+              </a:ext>
+            </a:extLst>
+          </p:cNvPr>
+          <p:cNvSpPr>
+            <a:spLocks noGrp="1"/>
+          </p:cNvSpPr>
+          <p:nvPr>
+            <p:ph idx="1"/>
+          </p:nvPr>
+        </p:nvSpPr>
+        <p:spPr/>
+        <p:txBody>
+          <a:bodyPr/>
+          <a:lstStyle/>
+          <a:p>
+            <a:r>
+              <a:rPr lang="en-US" dirty="0"/>
+              <a:t>“Ship motion prediction using deep learning and sensor fusion”</a:t>
+            </a:r>
+          </a:p>
+          <a:p>
+            <a:pPr marL="0" indent="0">
+              <a:buNone/>
+            </a:pPr>
+            <a:endParaRPr lang="en-US" dirty="0"/>
+          </a:p>
+        </p:txBody>
+      </p:sp>
+    </p:spTree>
+    <p:extLst>
+      <p:ext uri="{BB962C8B-B14F-4D97-AF65-F5344CB8AC3E}">
+        <p14:creationId xmlns:p14="http://schemas.microsoft.com/office/powerpoint/2010/main" val="878874818"/>
       </p:ext>
     </p:extLst>
   </p:cSld>
@@ -3613,7 +5511,7 @@
           <p:cNvPr id="2" name="Title 1">
             <a:extLst>
               <a:ext uri="{FF2B5EF4-FFF2-40B4-BE49-F238E27FC236}">
-                <a16:creationId xmlns:a16="http://schemas.microsoft.com/office/drawing/2014/main" id="{7B208C91-D9C8-47B7-8946-D88747A2BB49}"/>
+                <a16:creationId xmlns:a16="http://schemas.microsoft.com/office/drawing/2014/main" id="{E0C99628-6D05-4E50-967C-BD6AB7EAC16D}"/>
               </a:ext>
             </a:extLst>
           </p:cNvPr>
@@ -3631,50 +5529,65 @@
           <a:p>
             <a:r>
               <a:rPr lang="en-US" dirty="0"/>
-              <a:t>Pitch predictor</a:t>
-            </a:r>
-          </a:p>
-        </p:txBody>
-      </p:sp>
-      <p:pic>
-        <p:nvPicPr>
-          <p:cNvPr id="17" name="Content Placeholder 16" descr="A picture containing chart&#10;&#10;Description automatically generated">
-            <a:extLst>
-              <a:ext uri="{FF2B5EF4-FFF2-40B4-BE49-F238E27FC236}">
-                <a16:creationId xmlns:a16="http://schemas.microsoft.com/office/drawing/2014/main" id="{5D4A2588-C922-45E3-83C3-8416D5735281}"/>
-              </a:ext>
-            </a:extLst>
-          </p:cNvPr>
-          <p:cNvPicPr>
-            <a:picLocks noGrp="1" noChangeAspect="1"/>
-          </p:cNvPicPr>
+              <a:t>LSTM models to predict PR separately</a:t>
+            </a:r>
+          </a:p>
+        </p:txBody>
+      </p:sp>
+      <p:sp>
+        <p:nvSpPr>
+          <p:cNvPr id="3" name="Content Placeholder 2">
+            <a:extLst>
+              <a:ext uri="{FF2B5EF4-FFF2-40B4-BE49-F238E27FC236}">
+                <a16:creationId xmlns:a16="http://schemas.microsoft.com/office/drawing/2014/main" id="{87C38115-DA69-4933-93A1-084BC4408424}"/>
+              </a:ext>
+            </a:extLst>
+          </p:cNvPr>
+          <p:cNvSpPr>
+            <a:spLocks noGrp="1"/>
+          </p:cNvSpPr>
           <p:nvPr>
             <p:ph idx="1"/>
           </p:nvPr>
-        </p:nvPicPr>
-        <p:blipFill>
-          <a:blip r:embed="rId2">
-            <a:extLst>
-              <a:ext uri="{28A0092B-C50C-407E-A947-70E740481C1C}">
-                <a14:useLocalDpi xmlns:a14="http://schemas.microsoft.com/office/drawing/2010/main" val="0"/>
-              </a:ext>
-            </a:extLst>
-          </a:blip>
-          <a:stretch>
-            <a:fillRect/>
-          </a:stretch>
-        </p:blipFill>
-        <p:spPr>
-          <a:xfrm>
-            <a:off x="1714392" y="1825625"/>
-            <a:ext cx="8763216" cy="4351338"/>
-          </a:xfrm>
-        </p:spPr>
-      </p:pic>
+        </p:nvSpPr>
+        <p:spPr/>
+        <p:txBody>
+          <a:bodyPr/>
+          <a:lstStyle/>
+          <a:p>
+            <a:r>
+              <a:rPr lang="en-US" dirty="0"/>
+              <a:t>2 Stacked LSTM’s</a:t>
+            </a:r>
+          </a:p>
+          <a:p>
+            <a:r>
+              <a:rPr lang="en-US" dirty="0"/>
+              <a:t>128 hidden layers</a:t>
+            </a:r>
+          </a:p>
+          <a:p>
+            <a:r>
+              <a:rPr lang="en-US" dirty="0"/>
+              <a:t>8 epochs</a:t>
+            </a:r>
+          </a:p>
+          <a:p>
+            <a:r>
+              <a:rPr lang="en-US" dirty="0"/>
+              <a:t>64 </a:t>
+            </a:r>
+            <a:r>
+              <a:rPr lang="en-US"/>
+              <a:t>batch size</a:t>
+            </a:r>
+          </a:p>
+        </p:txBody>
+      </p:sp>
     </p:spTree>
     <p:extLst>
       <p:ext uri="{BB962C8B-B14F-4D97-AF65-F5344CB8AC3E}">
-        <p14:creationId xmlns:p14="http://schemas.microsoft.com/office/powerpoint/2010/main" val="2871227796"/>
+        <p14:creationId xmlns:p14="http://schemas.microsoft.com/office/powerpoint/2010/main" val="2108347234"/>
       </p:ext>
     </p:extLst>
   </p:cSld>
@@ -3731,10 +5644,10 @@
       </p:sp>
       <p:pic>
         <p:nvPicPr>
-          <p:cNvPr id="5" name="Content Placeholder 4" descr="A picture containing text, antenna&#10;&#10;Description automatically generated">
-            <a:extLst>
-              <a:ext uri="{FF2B5EF4-FFF2-40B4-BE49-F238E27FC236}">
-                <a16:creationId xmlns:a16="http://schemas.microsoft.com/office/drawing/2014/main" id="{85193236-A0D6-4FDD-BDD5-20B70AB07968}"/>
+          <p:cNvPr id="17" name="Content Placeholder 16" descr="A picture containing chart&#10;&#10;Description automatically generated">
+            <a:extLst>
+              <a:ext uri="{FF2B5EF4-FFF2-40B4-BE49-F238E27FC236}">
+                <a16:creationId xmlns:a16="http://schemas.microsoft.com/office/drawing/2014/main" id="{5D4A2588-C922-45E3-83C3-8416D5735281}"/>
               </a:ext>
             </a:extLst>
           </p:cNvPr>
@@ -3767,7 +5680,7 @@
     </p:spTree>
     <p:extLst>
       <p:ext uri="{BB962C8B-B14F-4D97-AF65-F5344CB8AC3E}">
-        <p14:creationId xmlns:p14="http://schemas.microsoft.com/office/powerpoint/2010/main" val="2899721130"/>
+        <p14:creationId xmlns:p14="http://schemas.microsoft.com/office/powerpoint/2010/main" val="2871227796"/>
       </p:ext>
     </p:extLst>
   </p:cSld>
@@ -3799,7 +5712,7 @@
           <p:cNvPr id="2" name="Title 1">
             <a:extLst>
               <a:ext uri="{FF2B5EF4-FFF2-40B4-BE49-F238E27FC236}">
-                <a16:creationId xmlns:a16="http://schemas.microsoft.com/office/drawing/2014/main" id="{3FE59884-60E7-4D38-9809-12D8D48E1840}"/>
+                <a16:creationId xmlns:a16="http://schemas.microsoft.com/office/drawing/2014/main" id="{7B208C91-D9C8-47B7-8946-D88747A2BB49}"/>
               </a:ext>
             </a:extLst>
           </p:cNvPr>
@@ -3822,124 +5735,45 @@
           </a:p>
         </p:txBody>
       </p:sp>
-      <p:sp>
-        <p:nvSpPr>
-          <p:cNvPr id="3" name="Content Placeholder 2">
-            <a:extLst>
-              <a:ext uri="{FF2B5EF4-FFF2-40B4-BE49-F238E27FC236}">
-                <a16:creationId xmlns:a16="http://schemas.microsoft.com/office/drawing/2014/main" id="{43AB06BB-CDBF-4197-B547-F5625F428E66}"/>
-              </a:ext>
-            </a:extLst>
-          </p:cNvPr>
-          <p:cNvSpPr>
-            <a:spLocks noGrp="1"/>
-          </p:cNvSpPr>
+      <p:pic>
+        <p:nvPicPr>
+          <p:cNvPr id="5" name="Content Placeholder 4" descr="A picture containing text, antenna&#10;&#10;Description automatically generated">
+            <a:extLst>
+              <a:ext uri="{FF2B5EF4-FFF2-40B4-BE49-F238E27FC236}">
+                <a16:creationId xmlns:a16="http://schemas.microsoft.com/office/drawing/2014/main" id="{85193236-A0D6-4FDD-BDD5-20B70AB07968}"/>
+              </a:ext>
+            </a:extLst>
+          </p:cNvPr>
+          <p:cNvPicPr>
+            <a:picLocks noGrp="1" noChangeAspect="1"/>
+          </p:cNvPicPr>
           <p:nvPr>
             <p:ph idx="1"/>
           </p:nvPr>
-        </p:nvSpPr>
-        <p:spPr/>
-        <p:txBody>
-          <a:bodyPr>
-            <a:normAutofit lnSpcReduction="10000"/>
-          </a:bodyPr>
-          <a:lstStyle/>
-          <a:p>
-            <a:r>
-              <a:rPr lang="en-US" dirty="0"/>
-              <a:t>Real prediction</a:t>
-            </a:r>
-          </a:p>
-          <a:p>
-            <a:pPr lvl="1"/>
-            <a:r>
-              <a:rPr lang="en-US" dirty="0"/>
-              <a:t>MSE: 	0.00271</a:t>
-            </a:r>
-          </a:p>
-          <a:p>
-            <a:pPr lvl="1"/>
-            <a:r>
-              <a:rPr lang="en-US" dirty="0"/>
-              <a:t>RMSE: 	0.0521</a:t>
-            </a:r>
-          </a:p>
-          <a:p>
-            <a:pPr lvl="1"/>
-            <a:r>
-              <a:rPr lang="en-US" dirty="0"/>
-              <a:t>RMSE </a:t>
-            </a:r>
-            <a:r>
-              <a:rPr lang="en-US" dirty="0" err="1"/>
-              <a:t>denorm</a:t>
-            </a:r>
-            <a:r>
-              <a:rPr lang="en-US" dirty="0"/>
-              <a:t>: 4.69°</a:t>
-            </a:r>
-          </a:p>
-          <a:p>
-            <a:r>
-              <a:rPr lang="en-US" dirty="0"/>
-              <a:t>Zero prediction</a:t>
-            </a:r>
-          </a:p>
-          <a:p>
-            <a:pPr lvl="1"/>
-            <a:r>
-              <a:rPr lang="en-US" dirty="0"/>
-              <a:t>MSE 0: 	0.00511</a:t>
-            </a:r>
-          </a:p>
-          <a:p>
-            <a:pPr lvl="1"/>
-            <a:r>
-              <a:rPr lang="en-US" dirty="0"/>
-              <a:t>RMSE 0: 	0.0715</a:t>
-            </a:r>
-          </a:p>
-          <a:p>
-            <a:pPr lvl="1"/>
-            <a:r>
-              <a:rPr lang="en-US" dirty="0"/>
-              <a:t>RMSE 0 </a:t>
-            </a:r>
-            <a:r>
-              <a:rPr lang="en-US" dirty="0" err="1"/>
-              <a:t>denorm</a:t>
-            </a:r>
-            <a:r>
-              <a:rPr lang="en-US" dirty="0"/>
-              <a:t>: 6.43°</a:t>
-            </a:r>
-          </a:p>
-          <a:p>
-            <a:r>
-              <a:rPr lang="en-US" dirty="0"/>
-              <a:t>Improvement on zero prediction:</a:t>
-            </a:r>
-          </a:p>
-          <a:p>
-            <a:pPr lvl="1"/>
-            <a:r>
-              <a:rPr lang="en-US" dirty="0"/>
-              <a:t>MSE delta%: 188.47 %</a:t>
-            </a:r>
-          </a:p>
-          <a:p>
-            <a:pPr lvl="1"/>
-            <a:r>
-              <a:rPr lang="en-US" dirty="0"/>
-              <a:t>RMSE delta%: 137.28 %</a:t>
-            </a:r>
-          </a:p>
-        </p:txBody>
-      </p:sp>
+        </p:nvPicPr>
+        <p:blipFill>
+          <a:blip r:embed="rId2">
+            <a:extLst>
+              <a:ext uri="{28A0092B-C50C-407E-A947-70E740481C1C}">
+                <a14:useLocalDpi xmlns:a14="http://schemas.microsoft.com/office/drawing/2010/main" val="0"/>
+              </a:ext>
+            </a:extLst>
+          </a:blip>
+          <a:stretch>
+            <a:fillRect/>
+          </a:stretch>
+        </p:blipFill>
+        <p:spPr>
+          <a:xfrm>
+            <a:off x="1714392" y="1825625"/>
+            <a:ext cx="8763216" cy="4351338"/>
+          </a:xfrm>
+        </p:spPr>
+      </p:pic>
     </p:spTree>
     <p:extLst>
       <p:ext uri="{BB962C8B-B14F-4D97-AF65-F5344CB8AC3E}">
-        <p14:creationId xmlns:p14="http://schemas.microsoft.com/office/powerpoint/2010/main" val="2410443765"/>
+        <p14:creationId xmlns:p14="http://schemas.microsoft.com/office/powerpoint/2010/main" val="2899721130"/>
       </p:ext>
     </p:extLst>
   </p:cSld>
@@ -3971,7 +5805,7 @@
           <p:cNvPr id="2" name="Title 1">
             <a:extLst>
               <a:ext uri="{FF2B5EF4-FFF2-40B4-BE49-F238E27FC236}">
-                <a16:creationId xmlns:a16="http://schemas.microsoft.com/office/drawing/2014/main" id="{9255084A-58AA-416E-8D59-21EF5CE06C21}"/>
+                <a16:creationId xmlns:a16="http://schemas.microsoft.com/office/drawing/2014/main" id="{3FE59884-60E7-4D38-9809-12D8D48E1840}"/>
               </a:ext>
             </a:extLst>
           </p:cNvPr>
@@ -3984,57 +5818,134 @@
         </p:nvSpPr>
         <p:spPr/>
         <p:txBody>
+          <a:bodyPr/>
+          <a:lstStyle/>
+          <a:p>
+            <a:r>
+              <a:rPr lang="en-US" dirty="0"/>
+              <a:t>Pitch predictor</a:t>
+            </a:r>
+          </a:p>
+        </p:txBody>
+      </p:sp>
+      <p:sp>
+        <p:nvSpPr>
+          <p:cNvPr id="3" name="Content Placeholder 2">
+            <a:extLst>
+              <a:ext uri="{FF2B5EF4-FFF2-40B4-BE49-F238E27FC236}">
+                <a16:creationId xmlns:a16="http://schemas.microsoft.com/office/drawing/2014/main" id="{43AB06BB-CDBF-4197-B547-F5625F428E66}"/>
+              </a:ext>
+            </a:extLst>
+          </p:cNvPr>
+          <p:cNvSpPr>
+            <a:spLocks noGrp="1"/>
+          </p:cNvSpPr>
+          <p:nvPr>
+            <p:ph idx="1"/>
+          </p:nvPr>
+        </p:nvSpPr>
+        <p:spPr/>
+        <p:txBody>
           <a:bodyPr>
-            <a:normAutofit/>
+            <a:normAutofit lnSpcReduction="10000"/>
           </a:bodyPr>
           <a:lstStyle/>
           <a:p>
             <a:r>
               <a:rPr lang="en-US" dirty="0"/>
-              <a:t>Roll predictor</a:t>
-            </a:r>
-          </a:p>
-        </p:txBody>
-      </p:sp>
-      <p:pic>
-        <p:nvPicPr>
-          <p:cNvPr id="5" name="Content Placeholder 4" descr="Chart&#10;&#10;Description automatically generated">
-            <a:extLst>
-              <a:ext uri="{FF2B5EF4-FFF2-40B4-BE49-F238E27FC236}">
-                <a16:creationId xmlns:a16="http://schemas.microsoft.com/office/drawing/2014/main" id="{9C381F10-395E-4DCB-8FA8-B6522CB84010}"/>
-              </a:ext>
-            </a:extLst>
-          </p:cNvPr>
-          <p:cNvPicPr>
-            <a:picLocks noGrp="1" noChangeAspect="1"/>
-          </p:cNvPicPr>
-          <p:nvPr>
-            <p:ph idx="1"/>
-          </p:nvPr>
-        </p:nvPicPr>
-        <p:blipFill>
-          <a:blip r:embed="rId2">
-            <a:extLst>
-              <a:ext uri="{28A0092B-C50C-407E-A947-70E740481C1C}">
-                <a14:useLocalDpi xmlns:a14="http://schemas.microsoft.com/office/drawing/2010/main" val="0"/>
-              </a:ext>
-            </a:extLst>
-          </a:blip>
-          <a:stretch>
-            <a:fillRect/>
-          </a:stretch>
-        </p:blipFill>
-        <p:spPr>
-          <a:xfrm>
-            <a:off x="1714392" y="1825625"/>
-            <a:ext cx="8763216" cy="4351338"/>
-          </a:xfrm>
-        </p:spPr>
-      </p:pic>
+              <a:t>Real prediction</a:t>
+            </a:r>
+          </a:p>
+          <a:p>
+            <a:pPr lvl="1"/>
+            <a:r>
+              <a:rPr lang="en-US" dirty="0"/>
+              <a:t>MSE: 	0.00271</a:t>
+            </a:r>
+          </a:p>
+          <a:p>
+            <a:pPr lvl="1"/>
+            <a:r>
+              <a:rPr lang="en-US" dirty="0"/>
+              <a:t>RMSE: 	0.0521</a:t>
+            </a:r>
+          </a:p>
+          <a:p>
+            <a:pPr lvl="1"/>
+            <a:r>
+              <a:rPr lang="en-US" dirty="0"/>
+              <a:t>RMSE </a:t>
+            </a:r>
+            <a:r>
+              <a:rPr lang="en-US" dirty="0" err="1"/>
+              <a:t>denorm</a:t>
+            </a:r>
+            <a:r>
+              <a:rPr lang="en-US" dirty="0"/>
+              <a:t>: 4.69°</a:t>
+            </a:r>
+          </a:p>
+          <a:p>
+            <a:r>
+              <a:rPr lang="en-US" dirty="0"/>
+              <a:t>Zero prediction</a:t>
+            </a:r>
+          </a:p>
+          <a:p>
+            <a:pPr lvl="1"/>
+            <a:r>
+              <a:rPr lang="en-US" dirty="0"/>
+              <a:t>MSE 0: 	0.00511</a:t>
+            </a:r>
+          </a:p>
+          <a:p>
+            <a:pPr lvl="1"/>
+            <a:r>
+              <a:rPr lang="en-US" dirty="0"/>
+              <a:t>RMSE 0: 	0.0715</a:t>
+            </a:r>
+          </a:p>
+          <a:p>
+            <a:pPr lvl="1"/>
+            <a:r>
+              <a:rPr lang="en-US" dirty="0"/>
+              <a:t>RMSE 0 </a:t>
+            </a:r>
+            <a:r>
+              <a:rPr lang="en-US" dirty="0" err="1"/>
+              <a:t>denorm</a:t>
+            </a:r>
+            <a:r>
+              <a:rPr lang="en-US" dirty="0"/>
+              <a:t>: 6.43°</a:t>
+            </a:r>
+          </a:p>
+          <a:p>
+            <a:r>
+              <a:rPr lang="en-US" dirty="0"/>
+              <a:t>Improvement on zero prediction:</a:t>
+            </a:r>
+          </a:p>
+          <a:p>
+            <a:pPr lvl="1"/>
+            <a:r>
+              <a:rPr lang="en-US" dirty="0"/>
+              <a:t>MSE delta%: 188.47 %</a:t>
+            </a:r>
+          </a:p>
+          <a:p>
+            <a:pPr lvl="1"/>
+            <a:r>
+              <a:rPr lang="en-US" dirty="0"/>
+              <a:t>RMSE delta%: 137.28 %</a:t>
+            </a:r>
+          </a:p>
+        </p:txBody>
+      </p:sp>
     </p:spTree>
     <p:extLst>
       <p:ext uri="{BB962C8B-B14F-4D97-AF65-F5344CB8AC3E}">
-        <p14:creationId xmlns:p14="http://schemas.microsoft.com/office/powerpoint/2010/main" val="4033617449"/>
+        <p14:creationId xmlns:p14="http://schemas.microsoft.com/office/powerpoint/2010/main" val="2410443765"/>
       </p:ext>
     </p:extLst>
   </p:cSld>
@@ -4093,10 +6004,10 @@
       </p:sp>
       <p:pic>
         <p:nvPicPr>
-          <p:cNvPr id="5" name="Content Placeholder 4" descr="Chart, line chart&#10;&#10;Description automatically generated">
-            <a:extLst>
-              <a:ext uri="{FF2B5EF4-FFF2-40B4-BE49-F238E27FC236}">
-                <a16:creationId xmlns:a16="http://schemas.microsoft.com/office/drawing/2014/main" id="{9117CC99-8FB8-430D-BDD1-6CB17C497E6C}"/>
+          <p:cNvPr id="5" name="Content Placeholder 4" descr="Chart&#10;&#10;Description automatically generated">
+            <a:extLst>
+              <a:ext uri="{FF2B5EF4-FFF2-40B4-BE49-F238E27FC236}">
+                <a16:creationId xmlns:a16="http://schemas.microsoft.com/office/drawing/2014/main" id="{9C381F10-395E-4DCB-8FA8-B6522CB84010}"/>
               </a:ext>
             </a:extLst>
           </p:cNvPr>
@@ -4129,7 +6040,7 @@
     </p:spTree>
     <p:extLst>
       <p:ext uri="{BB962C8B-B14F-4D97-AF65-F5344CB8AC3E}">
-        <p14:creationId xmlns:p14="http://schemas.microsoft.com/office/powerpoint/2010/main" val="3888522183"/>
+        <p14:creationId xmlns:p14="http://schemas.microsoft.com/office/powerpoint/2010/main" val="4033617449"/>
       </p:ext>
     </p:extLst>
   </p:cSld>
@@ -4186,124 +6097,45 @@
           </a:p>
         </p:txBody>
       </p:sp>
-      <p:sp>
-        <p:nvSpPr>
-          <p:cNvPr id="3" name="Content Placeholder 2">
-            <a:extLst>
-              <a:ext uri="{FF2B5EF4-FFF2-40B4-BE49-F238E27FC236}">
-                <a16:creationId xmlns:a16="http://schemas.microsoft.com/office/drawing/2014/main" id="{14BCEFB3-18AE-4CA3-AED0-2D523BA8BC6B}"/>
-              </a:ext>
-            </a:extLst>
-          </p:cNvPr>
-          <p:cNvSpPr>
-            <a:spLocks noGrp="1"/>
-          </p:cNvSpPr>
+      <p:pic>
+        <p:nvPicPr>
+          <p:cNvPr id="5" name="Content Placeholder 4" descr="Chart, line chart&#10;&#10;Description automatically generated">
+            <a:extLst>
+              <a:ext uri="{FF2B5EF4-FFF2-40B4-BE49-F238E27FC236}">
+                <a16:creationId xmlns:a16="http://schemas.microsoft.com/office/drawing/2014/main" id="{9117CC99-8FB8-430D-BDD1-6CB17C497E6C}"/>
+              </a:ext>
+            </a:extLst>
+          </p:cNvPr>
+          <p:cNvPicPr>
+            <a:picLocks noGrp="1" noChangeAspect="1"/>
+          </p:cNvPicPr>
           <p:nvPr>
             <p:ph idx="1"/>
           </p:nvPr>
-        </p:nvSpPr>
-        <p:spPr/>
-        <p:txBody>
-          <a:bodyPr>
-            <a:normAutofit lnSpcReduction="10000"/>
-          </a:bodyPr>
-          <a:lstStyle/>
-          <a:p>
-            <a:r>
-              <a:rPr lang="en-US" dirty="0"/>
-              <a:t>Real prediction</a:t>
-            </a:r>
-          </a:p>
-          <a:p>
-            <a:pPr lvl="1"/>
-            <a:r>
-              <a:rPr lang="en-US" dirty="0"/>
-              <a:t>MSE: 	0.00174</a:t>
-            </a:r>
-          </a:p>
-          <a:p>
-            <a:pPr lvl="1"/>
-            <a:r>
-              <a:rPr lang="en-US" dirty="0"/>
-              <a:t>RMSE: 	0.0418</a:t>
-            </a:r>
-          </a:p>
-          <a:p>
-            <a:pPr lvl="1"/>
-            <a:r>
-              <a:rPr lang="en-US" dirty="0"/>
-              <a:t>RMSE </a:t>
-            </a:r>
-            <a:r>
-              <a:rPr lang="en-US" dirty="0" err="1"/>
-              <a:t>denorm</a:t>
-            </a:r>
-            <a:r>
-              <a:rPr lang="en-US" dirty="0"/>
-              <a:t>: 3.76°</a:t>
-            </a:r>
-          </a:p>
-          <a:p>
-            <a:r>
-              <a:rPr lang="en-US" dirty="0"/>
-              <a:t>Zero prediction</a:t>
-            </a:r>
-          </a:p>
-          <a:p>
-            <a:pPr lvl="1"/>
-            <a:r>
-              <a:rPr lang="en-US" dirty="0"/>
-              <a:t>MSE 0: 	0.00657</a:t>
-            </a:r>
-          </a:p>
-          <a:p>
-            <a:pPr lvl="1"/>
-            <a:r>
-              <a:rPr lang="en-US" dirty="0"/>
-              <a:t>RMSE 0: 	0.0811</a:t>
-            </a:r>
-          </a:p>
-          <a:p>
-            <a:pPr lvl="1"/>
-            <a:r>
-              <a:rPr lang="en-US" dirty="0"/>
-              <a:t>RMSE 0 </a:t>
-            </a:r>
-            <a:r>
-              <a:rPr lang="en-US" dirty="0" err="1"/>
-              <a:t>denorm</a:t>
-            </a:r>
-            <a:r>
-              <a:rPr lang="en-US" dirty="0"/>
-              <a:t>: 7.29°</a:t>
-            </a:r>
-          </a:p>
-          <a:p>
-            <a:r>
-              <a:rPr lang="en-US" dirty="0"/>
-              <a:t>Improvement on zero prediction:</a:t>
-            </a:r>
-          </a:p>
-          <a:p>
-            <a:pPr lvl="1"/>
-            <a:r>
-              <a:rPr lang="en-US" dirty="0"/>
-              <a:t>MSE delta%: 376.27 %</a:t>
-            </a:r>
-          </a:p>
-          <a:p>
-            <a:pPr lvl="1"/>
-            <a:r>
-              <a:rPr lang="en-US" dirty="0"/>
-              <a:t>RMSE delta%: 193.98 %</a:t>
-            </a:r>
-          </a:p>
-        </p:txBody>
-      </p:sp>
+        </p:nvPicPr>
+        <p:blipFill>
+          <a:blip r:embed="rId2">
+            <a:extLst>
+              <a:ext uri="{28A0092B-C50C-407E-A947-70E740481C1C}">
+                <a14:useLocalDpi xmlns:a14="http://schemas.microsoft.com/office/drawing/2010/main" val="0"/>
+              </a:ext>
+            </a:extLst>
+          </a:blip>
+          <a:stretch>
+            <a:fillRect/>
+          </a:stretch>
+        </p:blipFill>
+        <p:spPr>
+          <a:xfrm>
+            <a:off x="1714392" y="1825625"/>
+            <a:ext cx="8763216" cy="4351338"/>
+          </a:xfrm>
+        </p:spPr>
+      </p:pic>
     </p:spTree>
     <p:extLst>
       <p:ext uri="{BB962C8B-B14F-4D97-AF65-F5344CB8AC3E}">
-        <p14:creationId xmlns:p14="http://schemas.microsoft.com/office/powerpoint/2010/main" val="2243441953"/>
+        <p14:creationId xmlns:p14="http://schemas.microsoft.com/office/powerpoint/2010/main" val="3888522183"/>
       </p:ext>
     </p:extLst>
   </p:cSld>
@@ -4335,7 +6167,7 @@
           <p:cNvPr id="2" name="Title 1">
             <a:extLst>
               <a:ext uri="{FF2B5EF4-FFF2-40B4-BE49-F238E27FC236}">
-                <a16:creationId xmlns:a16="http://schemas.microsoft.com/office/drawing/2014/main" id="{BA022918-8E0A-4718-AC66-06EB82A9E56D}"/>
+                <a16:creationId xmlns:a16="http://schemas.microsoft.com/office/drawing/2014/main" id="{9255084A-58AA-416E-8D59-21EF5CE06C21}"/>
               </a:ext>
             </a:extLst>
           </p:cNvPr>
@@ -4348,55 +6180,136 @@
         </p:nvSpPr>
         <p:spPr/>
         <p:txBody>
-          <a:bodyPr/>
-          <a:lstStyle/>
-          <a:p>
-            <a:r>
-              <a:rPr lang="en-US" dirty="0"/>
-              <a:t>PR predictor</a:t>
-            </a:r>
-          </a:p>
-        </p:txBody>
-      </p:sp>
-      <p:pic>
-        <p:nvPicPr>
-          <p:cNvPr id="9" name="Content Placeholder 8" descr="A picture containing shape&#10;&#10;Description automatically generated">
-            <a:extLst>
-              <a:ext uri="{FF2B5EF4-FFF2-40B4-BE49-F238E27FC236}">
-                <a16:creationId xmlns:a16="http://schemas.microsoft.com/office/drawing/2014/main" id="{25870745-0B01-420D-98D2-A35A0CE6F685}"/>
-              </a:ext>
-            </a:extLst>
-          </p:cNvPr>
-          <p:cNvPicPr>
-            <a:picLocks noGrp="1" noChangeAspect="1"/>
-          </p:cNvPicPr>
+          <a:bodyPr>
+            <a:normAutofit/>
+          </a:bodyPr>
+          <a:lstStyle/>
+          <a:p>
+            <a:r>
+              <a:rPr lang="en-US" dirty="0"/>
+              <a:t>Roll predictor</a:t>
+            </a:r>
+          </a:p>
+        </p:txBody>
+      </p:sp>
+      <p:sp>
+        <p:nvSpPr>
+          <p:cNvPr id="3" name="Content Placeholder 2">
+            <a:extLst>
+              <a:ext uri="{FF2B5EF4-FFF2-40B4-BE49-F238E27FC236}">
+                <a16:creationId xmlns:a16="http://schemas.microsoft.com/office/drawing/2014/main" id="{14BCEFB3-18AE-4CA3-AED0-2D523BA8BC6B}"/>
+              </a:ext>
+            </a:extLst>
+          </p:cNvPr>
+          <p:cNvSpPr>
+            <a:spLocks noGrp="1"/>
+          </p:cNvSpPr>
           <p:nvPr>
             <p:ph idx="1"/>
           </p:nvPr>
-        </p:nvPicPr>
-        <p:blipFill>
-          <a:blip r:embed="rId2">
-            <a:extLst>
-              <a:ext uri="{28A0092B-C50C-407E-A947-70E740481C1C}">
-                <a14:useLocalDpi xmlns:a14="http://schemas.microsoft.com/office/drawing/2010/main" val="0"/>
-              </a:ext>
-            </a:extLst>
-          </a:blip>
-          <a:stretch>
-            <a:fillRect/>
-          </a:stretch>
-        </p:blipFill>
-        <p:spPr>
-          <a:xfrm>
-            <a:off x="387927" y="1385833"/>
-            <a:ext cx="11074400" cy="5472167"/>
-          </a:xfrm>
-        </p:spPr>
-      </p:pic>
+        </p:nvSpPr>
+        <p:spPr/>
+        <p:txBody>
+          <a:bodyPr>
+            <a:normAutofit lnSpcReduction="10000"/>
+          </a:bodyPr>
+          <a:lstStyle/>
+          <a:p>
+            <a:r>
+              <a:rPr lang="en-US" dirty="0"/>
+              <a:t>Real prediction</a:t>
+            </a:r>
+          </a:p>
+          <a:p>
+            <a:pPr lvl="1"/>
+            <a:r>
+              <a:rPr lang="en-US" dirty="0"/>
+              <a:t>MSE: 	0.00174</a:t>
+            </a:r>
+          </a:p>
+          <a:p>
+            <a:pPr lvl="1"/>
+            <a:r>
+              <a:rPr lang="en-US" dirty="0"/>
+              <a:t>RMSE: 	0.0418</a:t>
+            </a:r>
+          </a:p>
+          <a:p>
+            <a:pPr lvl="1"/>
+            <a:r>
+              <a:rPr lang="en-US" dirty="0"/>
+              <a:t>RMSE </a:t>
+            </a:r>
+            <a:r>
+              <a:rPr lang="en-US" dirty="0" err="1"/>
+              <a:t>denorm</a:t>
+            </a:r>
+            <a:r>
+              <a:rPr lang="en-US" dirty="0"/>
+              <a:t>: 3.76°</a:t>
+            </a:r>
+          </a:p>
+          <a:p>
+            <a:r>
+              <a:rPr lang="en-US" dirty="0"/>
+              <a:t>Zero prediction</a:t>
+            </a:r>
+          </a:p>
+          <a:p>
+            <a:pPr lvl="1"/>
+            <a:r>
+              <a:rPr lang="en-US" dirty="0"/>
+              <a:t>MSE 0: 	0.00657</a:t>
+            </a:r>
+          </a:p>
+          <a:p>
+            <a:pPr lvl="1"/>
+            <a:r>
+              <a:rPr lang="en-US" dirty="0"/>
+              <a:t>RMSE 0: 	0.0811</a:t>
+            </a:r>
+          </a:p>
+          <a:p>
+            <a:pPr lvl="1"/>
+            <a:r>
+              <a:rPr lang="en-US" dirty="0"/>
+              <a:t>RMSE 0 </a:t>
+            </a:r>
+            <a:r>
+              <a:rPr lang="en-US" dirty="0" err="1"/>
+              <a:t>denorm</a:t>
+            </a:r>
+            <a:r>
+              <a:rPr lang="en-US" dirty="0"/>
+              <a:t>: 7.29°</a:t>
+            </a:r>
+          </a:p>
+          <a:p>
+            <a:r>
+              <a:rPr lang="en-US" dirty="0"/>
+              <a:t>Improvement on zero prediction:</a:t>
+            </a:r>
+          </a:p>
+          <a:p>
+            <a:pPr lvl="1"/>
+            <a:r>
+              <a:rPr lang="en-US" dirty="0"/>
+              <a:t>MSE delta%: 376.27 %</a:t>
+            </a:r>
+          </a:p>
+          <a:p>
+            <a:pPr lvl="1"/>
+            <a:r>
+              <a:rPr lang="en-US" dirty="0"/>
+              <a:t>RMSE delta%: 193.98 %</a:t>
+            </a:r>
+          </a:p>
+        </p:txBody>
+      </p:sp>
     </p:spTree>
     <p:extLst>
       <p:ext uri="{BB962C8B-B14F-4D97-AF65-F5344CB8AC3E}">
-        <p14:creationId xmlns:p14="http://schemas.microsoft.com/office/powerpoint/2010/main" val="1653259552"/>
+        <p14:creationId xmlns:p14="http://schemas.microsoft.com/office/powerpoint/2010/main" val="2243441953"/>
       </p:ext>
     </p:extLst>
   </p:cSld>

</xml_diff>

<commit_message>
paper and retraining of PR single output predictor
</commit_message>
<xml_diff>
--- a/Documentation/Presentations/Meeting 25-03-22.pptx
+++ b/Documentation/Presentations/Meeting 25-03-22.pptx
@@ -282,7 +282,7 @@
           <a:p>
             <a:fld id="{38FF4823-5548-4404-A190-104BA95D2A65}" type="datetimeFigureOut">
               <a:rPr lang="en-US" smtClean="0"/>
-              <a:t>3/25/2022</a:t>
+              <a:t>3/31/2022</a:t>
             </a:fld>
             <a:endParaRPr lang="en-US"/>
           </a:p>
@@ -336,7 +336,7 @@
           <a:p>
             <a:fld id="{702EAE66-E775-47C6-8934-C86F53395582}" type="slidenum">
               <a:rPr lang="en-US" smtClean="0"/>
-              <a:t>‹#›</a:t>
+              <a:t>‹nr.›</a:t>
             </a:fld>
             <a:endParaRPr lang="en-US"/>
           </a:p>
@@ -480,7 +480,7 @@
           <a:p>
             <a:fld id="{38FF4823-5548-4404-A190-104BA95D2A65}" type="datetimeFigureOut">
               <a:rPr lang="en-US" smtClean="0"/>
-              <a:t>3/25/2022</a:t>
+              <a:t>3/31/2022</a:t>
             </a:fld>
             <a:endParaRPr lang="en-US"/>
           </a:p>
@@ -534,7 +534,7 @@
           <a:p>
             <a:fld id="{702EAE66-E775-47C6-8934-C86F53395582}" type="slidenum">
               <a:rPr lang="en-US" smtClean="0"/>
-              <a:t>‹#›</a:t>
+              <a:t>‹nr.›</a:t>
             </a:fld>
             <a:endParaRPr lang="en-US"/>
           </a:p>
@@ -688,7 +688,7 @@
           <a:p>
             <a:fld id="{38FF4823-5548-4404-A190-104BA95D2A65}" type="datetimeFigureOut">
               <a:rPr lang="en-US" smtClean="0"/>
-              <a:t>3/25/2022</a:t>
+              <a:t>3/31/2022</a:t>
             </a:fld>
             <a:endParaRPr lang="en-US"/>
           </a:p>
@@ -742,7 +742,7 @@
           <a:p>
             <a:fld id="{702EAE66-E775-47C6-8934-C86F53395582}" type="slidenum">
               <a:rPr lang="en-US" smtClean="0"/>
-              <a:t>‹#›</a:t>
+              <a:t>‹nr.›</a:t>
             </a:fld>
             <a:endParaRPr lang="en-US"/>
           </a:p>
@@ -886,7 +886,7 @@
           <a:p>
             <a:fld id="{38FF4823-5548-4404-A190-104BA95D2A65}" type="datetimeFigureOut">
               <a:rPr lang="en-US" smtClean="0"/>
-              <a:t>3/25/2022</a:t>
+              <a:t>3/31/2022</a:t>
             </a:fld>
             <a:endParaRPr lang="en-US"/>
           </a:p>
@@ -940,7 +940,7 @@
           <a:p>
             <a:fld id="{702EAE66-E775-47C6-8934-C86F53395582}" type="slidenum">
               <a:rPr lang="en-US" smtClean="0"/>
-              <a:t>‹#›</a:t>
+              <a:t>‹nr.›</a:t>
             </a:fld>
             <a:endParaRPr lang="en-US"/>
           </a:p>
@@ -1161,7 +1161,7 @@
           <a:p>
             <a:fld id="{38FF4823-5548-4404-A190-104BA95D2A65}" type="datetimeFigureOut">
               <a:rPr lang="en-US" smtClean="0"/>
-              <a:t>3/25/2022</a:t>
+              <a:t>3/31/2022</a:t>
             </a:fld>
             <a:endParaRPr lang="en-US"/>
           </a:p>
@@ -1215,7 +1215,7 @@
           <a:p>
             <a:fld id="{702EAE66-E775-47C6-8934-C86F53395582}" type="slidenum">
               <a:rPr lang="en-US" smtClean="0"/>
-              <a:t>‹#›</a:t>
+              <a:t>‹nr.›</a:t>
             </a:fld>
             <a:endParaRPr lang="en-US"/>
           </a:p>
@@ -1426,7 +1426,7 @@
           <a:p>
             <a:fld id="{38FF4823-5548-4404-A190-104BA95D2A65}" type="datetimeFigureOut">
               <a:rPr lang="en-US" smtClean="0"/>
-              <a:t>3/25/2022</a:t>
+              <a:t>3/31/2022</a:t>
             </a:fld>
             <a:endParaRPr lang="en-US"/>
           </a:p>
@@ -1480,7 +1480,7 @@
           <a:p>
             <a:fld id="{702EAE66-E775-47C6-8934-C86F53395582}" type="slidenum">
               <a:rPr lang="en-US" smtClean="0"/>
-              <a:t>‹#›</a:t>
+              <a:t>‹nr.›</a:t>
             </a:fld>
             <a:endParaRPr lang="en-US"/>
           </a:p>
@@ -1838,7 +1838,7 @@
           <a:p>
             <a:fld id="{38FF4823-5548-4404-A190-104BA95D2A65}" type="datetimeFigureOut">
               <a:rPr lang="en-US" smtClean="0"/>
-              <a:t>3/25/2022</a:t>
+              <a:t>3/31/2022</a:t>
             </a:fld>
             <a:endParaRPr lang="en-US"/>
           </a:p>
@@ -1892,7 +1892,7 @@
           <a:p>
             <a:fld id="{702EAE66-E775-47C6-8934-C86F53395582}" type="slidenum">
               <a:rPr lang="en-US" smtClean="0"/>
-              <a:t>‹#›</a:t>
+              <a:t>‹nr.›</a:t>
             </a:fld>
             <a:endParaRPr lang="en-US"/>
           </a:p>
@@ -1979,7 +1979,7 @@
           <a:p>
             <a:fld id="{38FF4823-5548-4404-A190-104BA95D2A65}" type="datetimeFigureOut">
               <a:rPr lang="en-US" smtClean="0"/>
-              <a:t>3/25/2022</a:t>
+              <a:t>3/31/2022</a:t>
             </a:fld>
             <a:endParaRPr lang="en-US"/>
           </a:p>
@@ -2033,7 +2033,7 @@
           <a:p>
             <a:fld id="{702EAE66-E775-47C6-8934-C86F53395582}" type="slidenum">
               <a:rPr lang="en-US" smtClean="0"/>
-              <a:t>‹#›</a:t>
+              <a:t>‹nr.›</a:t>
             </a:fld>
             <a:endParaRPr lang="en-US"/>
           </a:p>
@@ -2092,7 +2092,7 @@
           <a:p>
             <a:fld id="{38FF4823-5548-4404-A190-104BA95D2A65}" type="datetimeFigureOut">
               <a:rPr lang="en-US" smtClean="0"/>
-              <a:t>3/25/2022</a:t>
+              <a:t>3/31/2022</a:t>
             </a:fld>
             <a:endParaRPr lang="en-US"/>
           </a:p>
@@ -2146,7 +2146,7 @@
           <a:p>
             <a:fld id="{702EAE66-E775-47C6-8934-C86F53395582}" type="slidenum">
               <a:rPr lang="en-US" smtClean="0"/>
-              <a:t>‹#›</a:t>
+              <a:t>‹nr.›</a:t>
             </a:fld>
             <a:endParaRPr lang="en-US"/>
           </a:p>
@@ -2403,7 +2403,7 @@
           <a:p>
             <a:fld id="{38FF4823-5548-4404-A190-104BA95D2A65}" type="datetimeFigureOut">
               <a:rPr lang="en-US" smtClean="0"/>
-              <a:t>3/25/2022</a:t>
+              <a:t>3/31/2022</a:t>
             </a:fld>
             <a:endParaRPr lang="en-US"/>
           </a:p>
@@ -2457,7 +2457,7 @@
           <a:p>
             <a:fld id="{702EAE66-E775-47C6-8934-C86F53395582}" type="slidenum">
               <a:rPr lang="en-US" smtClean="0"/>
-              <a:t>‹#›</a:t>
+              <a:t>‹nr.›</a:t>
             </a:fld>
             <a:endParaRPr lang="en-US"/>
           </a:p>
@@ -2691,7 +2691,7 @@
           <a:p>
             <a:fld id="{38FF4823-5548-4404-A190-104BA95D2A65}" type="datetimeFigureOut">
               <a:rPr lang="en-US" smtClean="0"/>
-              <a:t>3/25/2022</a:t>
+              <a:t>3/31/2022</a:t>
             </a:fld>
             <a:endParaRPr lang="en-US"/>
           </a:p>
@@ -2745,7 +2745,7 @@
           <a:p>
             <a:fld id="{702EAE66-E775-47C6-8934-C86F53395582}" type="slidenum">
               <a:rPr lang="en-US" smtClean="0"/>
-              <a:t>‹#›</a:t>
+              <a:t>‹nr.›</a:t>
             </a:fld>
             <a:endParaRPr lang="en-US"/>
           </a:p>
@@ -2932,7 +2932,7 @@
           <a:p>
             <a:fld id="{38FF4823-5548-4404-A190-104BA95D2A65}" type="datetimeFigureOut">
               <a:rPr lang="en-US" smtClean="0"/>
-              <a:t>3/25/2022</a:t>
+              <a:t>3/31/2022</a:t>
             </a:fld>
             <a:endParaRPr lang="en-US"/>
           </a:p>
@@ -3022,7 +3022,7 @@
           <a:p>
             <a:fld id="{702EAE66-E775-47C6-8934-C86F53395582}" type="slidenum">
               <a:rPr lang="en-US" smtClean="0"/>
-              <a:t>‹#›</a:t>
+              <a:t>‹nr.›</a:t>
             </a:fld>
             <a:endParaRPr lang="en-US"/>
           </a:p>
@@ -5076,14 +5076,14 @@
             <p:ph idx="1"/>
             <p:extLst>
               <p:ext uri="{D42A27DB-BD31-4B8C-83A1-F6EECF244321}">
-                <p14:modId xmlns:p14="http://schemas.microsoft.com/office/powerpoint/2010/main" val="1212844242"/>
+                <p14:modId xmlns:p14="http://schemas.microsoft.com/office/powerpoint/2010/main" val="1085951985"/>
               </p:ext>
             </p:extLst>
           </p:nvPr>
         </p:nvGraphicFramePr>
         <p:xfrm>
           <a:off x="838200" y="1825624"/>
-          <a:ext cx="10689771" cy="2289175"/>
+          <a:ext cx="10689771" cy="2747010"/>
         </p:xfrm>
         <a:graphic>
           <a:graphicData uri="http://schemas.openxmlformats.org/drawingml/2006/table">
@@ -5122,7 +5122,7 @@
                     <a:p>
                       <a:r>
                         <a:rPr lang="en-US" dirty="0"/>
-                        <a:t>MODEL (in -&gt;  out)</a:t>
+                        <a:t>MODEL (in -&gt;  out - epoch)</a:t>
                       </a:r>
                     </a:p>
                   </a:txBody>
@@ -5168,7 +5168,7 @@
                     <a:p>
                       <a:r>
                         <a:rPr lang="en-US" dirty="0"/>
-                        <a:t>50x2 PR -&gt; 1x1 Pitch</a:t>
+                        <a:t>50x2 PR -&gt; 1x1 Pitch - 8</a:t>
                       </a:r>
                     </a:p>
                   </a:txBody>
@@ -5231,7 +5231,7 @@
                       </a:pPr>
                       <a:r>
                         <a:rPr lang="en-US" dirty="0"/>
-                        <a:t>50x2 PR -&gt; 1x1 Roll</a:t>
+                        <a:t>50x2 PR -&gt; 1x1 Roll - 8</a:t>
                       </a:r>
                     </a:p>
                   </a:txBody>
@@ -5294,7 +5294,70 @@
                       </a:pPr>
                       <a:r>
                         <a:rPr lang="en-US" dirty="0"/>
-                        <a:t>50x2 PR -&gt; 1x2 PR </a:t>
+                        <a:t>50x2 PR -&gt; 1x2 PR - 8</a:t>
+                      </a:r>
+                    </a:p>
+                  </a:txBody>
+                  <a:tcPr/>
+                </a:tc>
+                <a:tc>
+                  <a:txBody>
+                    <a:bodyPr/>
+                    <a:lstStyle/>
+                    <a:p>
+                      <a:r>
+                        <a:rPr lang="en-US" dirty="0"/>
+                        <a:t>4.40°</a:t>
+                      </a:r>
+                    </a:p>
+                  </a:txBody>
+                  <a:tcPr/>
+                </a:tc>
+                <a:tc>
+                  <a:txBody>
+                    <a:bodyPr/>
+                    <a:lstStyle/>
+                    <a:p>
+                      <a:r>
+                        <a:rPr lang="en-US" dirty="0"/>
+                        <a:t>3.54°</a:t>
+                      </a:r>
+                    </a:p>
+                  </a:txBody>
+                  <a:tcPr/>
+                </a:tc>
+                <a:extLst>
+                  <a:ext uri="{0D108BD9-81ED-4DB2-BD59-A6C34878D82A}">
+                    <a16:rowId xmlns:a16="http://schemas.microsoft.com/office/drawing/2014/main" val="552448554"/>
+                  </a:ext>
+                </a:extLst>
+              </a:tr>
+              <a:tr h="457835">
+                <a:tc>
+                  <a:txBody>
+                    <a:bodyPr/>
+                    <a:lstStyle/>
+                    <a:p>
+                      <a:pPr marL="0" marR="0" lvl="0" indent="0" algn="l" defTabSz="914400" rtl="0" eaLnBrk="1" fontAlgn="auto" latinLnBrk="0" hangingPunct="1">
+                        <a:lnSpc>
+                          <a:spcPct val="100000"/>
+                        </a:lnSpc>
+                        <a:spcBef>
+                          <a:spcPts val="0"/>
+                        </a:spcBef>
+                        <a:spcAft>
+                          <a:spcPts val="0"/>
+                        </a:spcAft>
+                        <a:buClrTx/>
+                        <a:buSzTx/>
+                        <a:buFontTx/>
+                        <a:buNone/>
+                        <a:tabLst/>
+                        <a:defRPr/>
+                      </a:pPr>
+                      <a:r>
+                        <a:rPr lang="en-US" dirty="0"/>
+                        <a:t>50x2 PR -&gt; 1x2 PR - 50</a:t>
                       </a:r>
                     </a:p>
                   </a:txBody>
@@ -5357,8 +5420,13 @@
                       </a:pPr>
                       <a:r>
                         <a:rPr lang="en-US" dirty="0"/>
-                        <a:t>10x2 PR -&gt; 1x2 PR </a:t>
+                        <a:t>10x2 PR -&gt; 1x2 </a:t>
                       </a:r>
+                      <a:r>
+                        <a:rPr lang="en-US"/>
+                        <a:t>PR - 50</a:t>
+                      </a:r>
+                      <a:endParaRPr lang="en-US" dirty="0"/>
                     </a:p>
                   </a:txBody>
                   <a:tcPr/>

</xml_diff>